<commit_message>
Added files to list classifier and dataset names.
</commit_message>
<xml_diff>
--- a/figures/src_files/NTM_Update_3_5_18.pptx
+++ b/figures/src_files/NTM_Update_3_5_18.pptx
@@ -112,6 +112,11 @@
       </a:defRPr>
     </a:lvl9pPr>
   </p:defaultTextStyle>
+  <p:extLst>
+    <p:ext uri="{EFAFB233-063F-42B5-8137-9DF3F51BA10A}">
+      <p15:sldGuideLst xmlns:p15="http://schemas.microsoft.com/office/powerpoint/2012/main"/>
+    </p:ext>
+  </p:extLst>
 </p:presentation>
 </file>
 
@@ -262,7 +267,7 @@
           <a:p>
             <a:fld id="{C2DF1586-880F-4D32-8F92-5423360BAD02}" type="datetimeFigureOut">
               <a:rPr lang="en-US" smtClean="0"/>
-              <a:t>3/4/2018</a:t>
+              <a:t>3/5/2018</a:t>
             </a:fld>
             <a:endParaRPr lang="en-US"/>
           </a:p>
@@ -460,7 +465,7 @@
           <a:p>
             <a:fld id="{C2DF1586-880F-4D32-8F92-5423360BAD02}" type="datetimeFigureOut">
               <a:rPr lang="en-US" smtClean="0"/>
-              <a:t>3/4/2018</a:t>
+              <a:t>3/5/2018</a:t>
             </a:fld>
             <a:endParaRPr lang="en-US"/>
           </a:p>
@@ -668,7 +673,7 @@
           <a:p>
             <a:fld id="{C2DF1586-880F-4D32-8F92-5423360BAD02}" type="datetimeFigureOut">
               <a:rPr lang="en-US" smtClean="0"/>
-              <a:t>3/4/2018</a:t>
+              <a:t>3/5/2018</a:t>
             </a:fld>
             <a:endParaRPr lang="en-US"/>
           </a:p>
@@ -866,7 +871,7 @@
           <a:p>
             <a:fld id="{C2DF1586-880F-4D32-8F92-5423360BAD02}" type="datetimeFigureOut">
               <a:rPr lang="en-US" smtClean="0"/>
-              <a:t>3/4/2018</a:t>
+              <a:t>3/5/2018</a:t>
             </a:fld>
             <a:endParaRPr lang="en-US"/>
           </a:p>
@@ -1141,7 +1146,7 @@
           <a:p>
             <a:fld id="{C2DF1586-880F-4D32-8F92-5423360BAD02}" type="datetimeFigureOut">
               <a:rPr lang="en-US" smtClean="0"/>
-              <a:t>3/4/2018</a:t>
+              <a:t>3/5/2018</a:t>
             </a:fld>
             <a:endParaRPr lang="en-US"/>
           </a:p>
@@ -1406,7 +1411,7 @@
           <a:p>
             <a:fld id="{C2DF1586-880F-4D32-8F92-5423360BAD02}" type="datetimeFigureOut">
               <a:rPr lang="en-US" smtClean="0"/>
-              <a:t>3/4/2018</a:t>
+              <a:t>3/5/2018</a:t>
             </a:fld>
             <a:endParaRPr lang="en-US"/>
           </a:p>
@@ -1818,7 +1823,7 @@
           <a:p>
             <a:fld id="{C2DF1586-880F-4D32-8F92-5423360BAD02}" type="datetimeFigureOut">
               <a:rPr lang="en-US" smtClean="0"/>
-              <a:t>3/4/2018</a:t>
+              <a:t>3/5/2018</a:t>
             </a:fld>
             <a:endParaRPr lang="en-US"/>
           </a:p>
@@ -1959,7 +1964,7 @@
           <a:p>
             <a:fld id="{C2DF1586-880F-4D32-8F92-5423360BAD02}" type="datetimeFigureOut">
               <a:rPr lang="en-US" smtClean="0"/>
-              <a:t>3/4/2018</a:t>
+              <a:t>3/5/2018</a:t>
             </a:fld>
             <a:endParaRPr lang="en-US"/>
           </a:p>
@@ -2072,7 +2077,7 @@
           <a:p>
             <a:fld id="{C2DF1586-880F-4D32-8F92-5423360BAD02}" type="datetimeFigureOut">
               <a:rPr lang="en-US" smtClean="0"/>
-              <a:t>3/4/2018</a:t>
+              <a:t>3/5/2018</a:t>
             </a:fld>
             <a:endParaRPr lang="en-US"/>
           </a:p>
@@ -2383,7 +2388,7 @@
           <a:p>
             <a:fld id="{C2DF1586-880F-4D32-8F92-5423360BAD02}" type="datetimeFigureOut">
               <a:rPr lang="en-US" smtClean="0"/>
-              <a:t>3/4/2018</a:t>
+              <a:t>3/5/2018</a:t>
             </a:fld>
             <a:endParaRPr lang="en-US"/>
           </a:p>
@@ -2671,7 +2676,7 @@
           <a:p>
             <a:fld id="{C2DF1586-880F-4D32-8F92-5423360BAD02}" type="datetimeFigureOut">
               <a:rPr lang="en-US" smtClean="0"/>
-              <a:t>3/4/2018</a:t>
+              <a:t>3/5/2018</a:t>
             </a:fld>
             <a:endParaRPr lang="en-US"/>
           </a:p>
@@ -2912,7 +2917,7 @@
           <a:p>
             <a:fld id="{C2DF1586-880F-4D32-8F92-5423360BAD02}" type="datetimeFigureOut">
               <a:rPr lang="en-US" smtClean="0"/>
-              <a:t>3/4/2018</a:t>
+              <a:t>3/5/2018</a:t>
             </a:fld>
             <a:endParaRPr lang="en-US"/>
           </a:p>
@@ -4359,7 +4364,7 @@
         </p:nvSpPr>
         <p:spPr>
           <a:xfrm>
-            <a:off x="812800" y="50957"/>
+            <a:off x="812800" y="1082"/>
             <a:ext cx="10575636" cy="1057417"/>
           </a:xfrm>
         </p:spPr>
@@ -4394,14 +4399,14 @@
           <p:nvPr>
             <p:extLst>
               <p:ext uri="{D42A27DB-BD31-4B8C-83A1-F6EECF244321}">
-                <p14:modId xmlns:p14="http://schemas.microsoft.com/office/powerpoint/2010/main" val="1208674160"/>
+                <p14:modId xmlns:p14="http://schemas.microsoft.com/office/powerpoint/2010/main" val="783005714"/>
               </p:ext>
             </p:extLst>
           </p:nvPr>
         </p:nvGraphicFramePr>
         <p:xfrm>
-          <a:off x="868218" y="1014597"/>
-          <a:ext cx="10455564" cy="4585410"/>
+          <a:off x="2076350" y="1629738"/>
+          <a:ext cx="7743768" cy="2682240"/>
         </p:xfrm>
         <a:graphic>
           <a:graphicData uri="http://schemas.openxmlformats.org/drawingml/2006/table">
@@ -4410,38 +4415,24 @@
                 <a:tableStyleId>{5C22544A-7EE6-4342-B048-85BDC9FD1C3A}</a:tableStyleId>
               </a:tblPr>
               <a:tblGrid>
-                <a:gridCol w="2626568">
+                <a:gridCol w="2500569">
                   <a:extLst>
                     <a:ext uri="{9D8B030D-6E8A-4147-A177-3AD203B41FA5}">
                       <a16:colId xmlns:a16="http://schemas.microsoft.com/office/drawing/2014/main" val="2439493466"/>
                     </a:ext>
                   </a:extLst>
                 </a:gridCol>
-                <a:gridCol w="2149931">
+                <a:gridCol w="2350370">
                   <a:extLst>
                     <a:ext uri="{9D8B030D-6E8A-4147-A177-3AD203B41FA5}">
                       <a16:colId xmlns:a16="http://schemas.microsoft.com/office/drawing/2014/main" val="3363315367"/>
                     </a:ext>
                   </a:extLst>
                 </a:gridCol>
-                <a:gridCol w="2160073">
+                <a:gridCol w="2892829">
                   <a:extLst>
                     <a:ext uri="{9D8B030D-6E8A-4147-A177-3AD203B41FA5}">
                       <a16:colId xmlns:a16="http://schemas.microsoft.com/office/drawing/2014/main" val="365963346"/>
-                    </a:ext>
-                  </a:extLst>
-                </a:gridCol>
-                <a:gridCol w="1754426">
-                  <a:extLst>
-                    <a:ext uri="{9D8B030D-6E8A-4147-A177-3AD203B41FA5}">
-                      <a16:colId xmlns:a16="http://schemas.microsoft.com/office/drawing/2014/main" val="4169956478"/>
-                    </a:ext>
-                  </a:extLst>
-                </a:gridCol>
-                <a:gridCol w="1764566">
-                  <a:extLst>
-                    <a:ext uri="{9D8B030D-6E8A-4147-A177-3AD203B41FA5}">
-                      <a16:colId xmlns:a16="http://schemas.microsoft.com/office/drawing/2014/main" val="1672964360"/>
                     </a:ext>
                   </a:extLst>
                 </a:gridCol>
@@ -4621,122 +4612,6 @@
                     <a:noFill/>
                   </a:tcPr>
                 </a:tc>
-                <a:tc>
-                  <a:txBody>
-                    <a:bodyPr/>
-                    <a:lstStyle/>
-                    <a:p>
-                      <a:pPr algn="ctr"/>
-                      <a:r>
-                        <a:rPr lang="en-US" sz="2400" dirty="0">
-                          <a:solidFill>
-                            <a:schemeClr val="tx1"/>
-                          </a:solidFill>
-                          <a:latin typeface="Times New Roman" panose="02020603050405020304" pitchFamily="18" charset="0"/>
-                          <a:cs typeface="Times New Roman" panose="02020603050405020304" pitchFamily="18" charset="0"/>
-                        </a:rPr>
-                        <a:t>Structural Features</a:t>
-                      </a:r>
-                    </a:p>
-                  </a:txBody>
-                  <a:tcPr anchor="ctr">
-                    <a:lnL w="12700" cap="flat" cmpd="sng" algn="ctr">
-                      <a:solidFill>
-                        <a:schemeClr val="tx1"/>
-                      </a:solidFill>
-                      <a:prstDash val="solid"/>
-                      <a:round/>
-                      <a:headEnd type="none" w="med" len="med"/>
-                      <a:tailEnd type="none" w="med" len="med"/>
-                    </a:lnL>
-                    <a:lnR w="12700" cap="flat" cmpd="sng" algn="ctr">
-                      <a:solidFill>
-                        <a:schemeClr val="tx1"/>
-                      </a:solidFill>
-                      <a:prstDash val="solid"/>
-                      <a:round/>
-                      <a:headEnd type="none" w="med" len="med"/>
-                      <a:tailEnd type="none" w="med" len="med"/>
-                    </a:lnR>
-                    <a:lnT w="12700" cap="flat" cmpd="sng" algn="ctr">
-                      <a:solidFill>
-                        <a:schemeClr val="tx1"/>
-                      </a:solidFill>
-                      <a:prstDash val="solid"/>
-                      <a:round/>
-                      <a:headEnd type="none" w="med" len="med"/>
-                      <a:tailEnd type="none" w="med" len="med"/>
-                    </a:lnT>
-                    <a:lnB w="12700" cap="flat" cmpd="sng" algn="ctr">
-                      <a:solidFill>
-                        <a:schemeClr val="tx1"/>
-                      </a:solidFill>
-                      <a:prstDash val="solid"/>
-                      <a:round/>
-                      <a:headEnd type="none" w="med" len="med"/>
-                      <a:tailEnd type="none" w="med" len="med"/>
-                    </a:lnB>
-                    <a:noFill/>
-                  </a:tcPr>
-                </a:tc>
-                <a:tc>
-                  <a:txBody>
-                    <a:bodyPr/>
-                    <a:lstStyle/>
-                    <a:p>
-                      <a:pPr algn="ctr"/>
-                      <a:r>
-                        <a:rPr lang="en-US" sz="2400" dirty="0">
-                          <a:solidFill>
-                            <a:schemeClr val="tx1"/>
-                          </a:solidFill>
-                          <a:latin typeface="Times New Roman" panose="02020603050405020304" pitchFamily="18" charset="0"/>
-                          <a:cs typeface="Times New Roman" panose="02020603050405020304" pitchFamily="18" charset="0"/>
-                        </a:rPr>
-                        <a:t>Dynamical Features</a:t>
-                      </a:r>
-                    </a:p>
-                  </a:txBody>
-                  <a:tcPr anchor="ctr">
-                    <a:lnL w="12700" cap="flat" cmpd="sng" algn="ctr">
-                      <a:solidFill>
-                        <a:schemeClr val="tx1"/>
-                      </a:solidFill>
-                      <a:prstDash val="solid"/>
-                      <a:round/>
-                      <a:headEnd type="none" w="med" len="med"/>
-                      <a:tailEnd type="none" w="med" len="med"/>
-                    </a:lnL>
-                    <a:lnR w="12700" cap="flat" cmpd="sng" algn="ctr">
-                      <a:solidFill>
-                        <a:schemeClr val="tx1"/>
-                      </a:solidFill>
-                      <a:prstDash val="solid"/>
-                      <a:round/>
-                      <a:headEnd type="none" w="med" len="med"/>
-                      <a:tailEnd type="none" w="med" len="med"/>
-                    </a:lnR>
-                    <a:lnT w="12700" cap="flat" cmpd="sng" algn="ctr">
-                      <a:solidFill>
-                        <a:schemeClr val="tx1"/>
-                      </a:solidFill>
-                      <a:prstDash val="solid"/>
-                      <a:round/>
-                      <a:headEnd type="none" w="med" len="med"/>
-                      <a:tailEnd type="none" w="med" len="med"/>
-                    </a:lnT>
-                    <a:lnB w="12700" cap="flat" cmpd="sng" algn="ctr">
-                      <a:solidFill>
-                        <a:schemeClr val="tx1"/>
-                      </a:solidFill>
-                      <a:prstDash val="solid"/>
-                      <a:round/>
-                      <a:headEnd type="none" w="med" len="med"/>
-                      <a:tailEnd type="none" w="med" len="med"/>
-                    </a:lnB>
-                    <a:noFill/>
-                  </a:tcPr>
-                </a:tc>
                 <a:extLst>
                   <a:ext uri="{0D108BD9-81ED-4DB2-BD59-A6C34878D82A}">
                     <a16:rowId xmlns:a16="http://schemas.microsoft.com/office/drawing/2014/main" val="402075987"/>
@@ -4751,6 +4626,16 @@
                     <a:p>
                       <a:pPr algn="ctr"/>
                       <a:r>
+                        <a:rPr lang="en-US" sz="1800" b="1" dirty="0" smtClean="0">
+                          <a:solidFill>
+                            <a:schemeClr val="tx1"/>
+                          </a:solidFill>
+                          <a:latin typeface="Times New Roman" panose="02020603050405020304" pitchFamily="18" charset="0"/>
+                          <a:cs typeface="Times New Roman" panose="02020603050405020304" pitchFamily="18" charset="0"/>
+                        </a:rPr>
+                        <a:t>Disease-All </a:t>
+                      </a:r>
+                      <a:r>
                         <a:rPr lang="en-US" sz="1800" b="1" dirty="0">
                           <a:solidFill>
                             <a:schemeClr val="tx1"/>
@@ -4758,7 +4643,222 @@
                           <a:latin typeface="Times New Roman" panose="02020603050405020304" pitchFamily="18" charset="0"/>
                           <a:cs typeface="Times New Roman" panose="02020603050405020304" pitchFamily="18" charset="0"/>
                         </a:rPr>
-                        <a:t>Disease-All-SD (1)</a:t>
+                        <a:t>(1)</a:t>
+                      </a:r>
+                    </a:p>
+                  </a:txBody>
+                  <a:tcPr anchor="ctr">
+                    <a:lnL w="12700" cap="flat" cmpd="sng" algn="ctr">
+                      <a:solidFill>
+                        <a:schemeClr val="tx1"/>
+                      </a:solidFill>
+                      <a:prstDash val="solid"/>
+                      <a:round/>
+                      <a:headEnd type="none" w="med" len="med"/>
+                      <a:tailEnd type="none" w="med" len="med"/>
+                    </a:lnL>
+                    <a:lnR w="12700" cap="flat" cmpd="sng" algn="ctr">
+                      <a:solidFill>
+                        <a:schemeClr val="tx1"/>
+                      </a:solidFill>
+                      <a:prstDash val="solid"/>
+                      <a:round/>
+                      <a:headEnd type="none" w="med" len="med"/>
+                      <a:tailEnd type="none" w="med" len="med"/>
+                    </a:lnR>
+                    <a:lnT w="12700" cap="flat" cmpd="sng" algn="ctr">
+                      <a:solidFill>
+                        <a:schemeClr val="tx1"/>
+                      </a:solidFill>
+                      <a:prstDash val="solid"/>
+                      <a:round/>
+                      <a:headEnd type="none" w="med" len="med"/>
+                      <a:tailEnd type="none" w="med" len="med"/>
+                    </a:lnT>
+                    <a:lnB w="12700" cap="flat" cmpd="sng" algn="ctr">
+                      <a:solidFill>
+                        <a:schemeClr val="tx1"/>
+                      </a:solidFill>
+                      <a:prstDash val="solid"/>
+                      <a:round/>
+                      <a:headEnd type="none" w="med" len="med"/>
+                      <a:tailEnd type="none" w="med" len="med"/>
+                    </a:lnB>
+                    <a:noFill/>
+                  </a:tcPr>
+                </a:tc>
+                <a:tc>
+                  <a:txBody>
+                    <a:bodyPr/>
+                    <a:lstStyle/>
+                    <a:p>
+                      <a:pPr algn="ctr"/>
+                      <a:r>
+                        <a:rPr lang="en-US" sz="1800" dirty="0">
+                          <a:solidFill>
+                            <a:schemeClr val="tx1"/>
+                          </a:solidFill>
+                          <a:latin typeface="Times New Roman" panose="02020603050405020304" pitchFamily="18" charset="0"/>
+                          <a:cs typeface="Times New Roman" panose="02020603050405020304" pitchFamily="18" charset="0"/>
+                        </a:rPr>
+                        <a:t>NTM </a:t>
+                      </a:r>
+                      <a:r>
+                        <a:rPr lang="en-US" sz="1800" dirty="0" smtClean="0">
+                          <a:solidFill>
+                            <a:schemeClr val="tx1"/>
+                          </a:solidFill>
+                          <a:latin typeface="Times New Roman" panose="02020603050405020304" pitchFamily="18" charset="0"/>
+                          <a:cs typeface="Times New Roman" panose="02020603050405020304" pitchFamily="18" charset="0"/>
+                        </a:rPr>
+                        <a:t>disease</a:t>
+                      </a:r>
+                      <a:endParaRPr lang="en-US" sz="1800" dirty="0">
+                        <a:solidFill>
+                          <a:schemeClr val="tx1"/>
+                        </a:solidFill>
+                        <a:latin typeface="Times New Roman" panose="02020603050405020304" pitchFamily="18" charset="0"/>
+                        <a:cs typeface="Times New Roman" panose="02020603050405020304" pitchFamily="18" charset="0"/>
+                      </a:endParaRPr>
+                    </a:p>
+                  </a:txBody>
+                  <a:tcPr anchor="ctr">
+                    <a:lnL w="12700" cap="flat" cmpd="sng" algn="ctr">
+                      <a:solidFill>
+                        <a:schemeClr val="tx1"/>
+                      </a:solidFill>
+                      <a:prstDash val="solid"/>
+                      <a:round/>
+                      <a:headEnd type="none" w="med" len="med"/>
+                      <a:tailEnd type="none" w="med" len="med"/>
+                    </a:lnL>
+                    <a:lnR w="12700" cap="flat" cmpd="sng" algn="ctr">
+                      <a:solidFill>
+                        <a:schemeClr val="tx1"/>
+                      </a:solidFill>
+                      <a:prstDash val="solid"/>
+                      <a:round/>
+                      <a:headEnd type="none" w="med" len="med"/>
+                      <a:tailEnd type="none" w="med" len="med"/>
+                    </a:lnR>
+                    <a:lnT w="12700" cap="flat" cmpd="sng" algn="ctr">
+                      <a:solidFill>
+                        <a:schemeClr val="tx1"/>
+                      </a:solidFill>
+                      <a:prstDash val="solid"/>
+                      <a:round/>
+                      <a:headEnd type="none" w="med" len="med"/>
+                      <a:tailEnd type="none" w="med" len="med"/>
+                    </a:lnT>
+                    <a:lnB w="12700" cap="flat" cmpd="sng" algn="ctr">
+                      <a:solidFill>
+                        <a:schemeClr val="tx1"/>
+                      </a:solidFill>
+                      <a:prstDash val="solid"/>
+                      <a:round/>
+                      <a:headEnd type="none" w="med" len="med"/>
+                      <a:tailEnd type="none" w="med" len="med"/>
+                    </a:lnB>
+                    <a:noFill/>
+                  </a:tcPr>
+                </a:tc>
+                <a:tc>
+                  <a:txBody>
+                    <a:bodyPr/>
+                    <a:lstStyle/>
+                    <a:p>
+                      <a:pPr algn="ctr"/>
+                      <a:r>
+                        <a:rPr lang="en-US" sz="1800" dirty="0" smtClean="0">
+                          <a:solidFill>
+                            <a:schemeClr val="tx1"/>
+                          </a:solidFill>
+                          <a:latin typeface="Times New Roman" panose="02020603050405020304" pitchFamily="18" charset="0"/>
+                          <a:cs typeface="Times New Roman" panose="02020603050405020304" pitchFamily="18" charset="0"/>
+                        </a:rPr>
+                        <a:t>All</a:t>
+                      </a:r>
+                      <a:endParaRPr lang="en-US" sz="1800" dirty="0">
+                        <a:solidFill>
+                          <a:schemeClr val="tx1"/>
+                        </a:solidFill>
+                        <a:latin typeface="Times New Roman" panose="02020603050405020304" pitchFamily="18" charset="0"/>
+                        <a:cs typeface="Times New Roman" panose="02020603050405020304" pitchFamily="18" charset="0"/>
+                      </a:endParaRPr>
+                    </a:p>
+                  </a:txBody>
+                  <a:tcPr anchor="ctr">
+                    <a:lnL w="12700" cap="flat" cmpd="sng" algn="ctr">
+                      <a:solidFill>
+                        <a:schemeClr val="tx1"/>
+                      </a:solidFill>
+                      <a:prstDash val="solid"/>
+                      <a:round/>
+                      <a:headEnd type="none" w="med" len="med"/>
+                      <a:tailEnd type="none" w="med" len="med"/>
+                    </a:lnL>
+                    <a:lnR w="12700" cap="flat" cmpd="sng" algn="ctr">
+                      <a:solidFill>
+                        <a:schemeClr val="tx1"/>
+                      </a:solidFill>
+                      <a:prstDash val="solid"/>
+                      <a:round/>
+                      <a:headEnd type="none" w="med" len="med"/>
+                      <a:tailEnd type="none" w="med" len="med"/>
+                    </a:lnR>
+                    <a:lnT w="12700" cap="flat" cmpd="sng" algn="ctr">
+                      <a:solidFill>
+                        <a:schemeClr val="tx1"/>
+                      </a:solidFill>
+                      <a:prstDash val="solid"/>
+                      <a:round/>
+                      <a:headEnd type="none" w="med" len="med"/>
+                      <a:tailEnd type="none" w="med" len="med"/>
+                    </a:lnT>
+                    <a:lnB w="12700" cap="flat" cmpd="sng" algn="ctr">
+                      <a:solidFill>
+                        <a:schemeClr val="tx1"/>
+                      </a:solidFill>
+                      <a:prstDash val="solid"/>
+                      <a:round/>
+                      <a:headEnd type="none" w="med" len="med"/>
+                      <a:tailEnd type="none" w="med" len="med"/>
+                    </a:lnB>
+                    <a:noFill/>
+                  </a:tcPr>
+                </a:tc>
+                <a:extLst>
+                  <a:ext uri="{0D108BD9-81ED-4DB2-BD59-A6C34878D82A}">
+                    <a16:rowId xmlns:a16="http://schemas.microsoft.com/office/drawing/2014/main" val="3600208251"/>
+                  </a:ext>
+                </a:extLst>
+              </a:tr>
+              <a:tr h="370840">
+                <a:tc>
+                  <a:txBody>
+                    <a:bodyPr/>
+                    <a:lstStyle/>
+                    <a:p>
+                      <a:pPr algn="ctr"/>
+                      <a:r>
+                        <a:rPr lang="en-US" sz="1800" b="1" dirty="0" smtClean="0">
+                          <a:solidFill>
+                            <a:schemeClr val="tx1"/>
+                          </a:solidFill>
+                          <a:latin typeface="Times New Roman" panose="02020603050405020304" pitchFamily="18" charset="0"/>
+                          <a:cs typeface="Times New Roman" panose="02020603050405020304" pitchFamily="18" charset="0"/>
+                        </a:rPr>
+                        <a:t>Disease-Main </a:t>
+                      </a:r>
+                      <a:r>
+                        <a:rPr lang="en-US" sz="1800" b="1" dirty="0">
+                          <a:solidFill>
+                            <a:schemeClr val="tx1"/>
+                          </a:solidFill>
+                          <a:latin typeface="Times New Roman" panose="02020603050405020304" pitchFamily="18" charset="0"/>
+                          <a:cs typeface="Times New Roman" panose="02020603050405020304" pitchFamily="18" charset="0"/>
+                        </a:rPr>
+                        <a:t>(2)</a:t>
                       </a:r>
                     </a:p>
                   </a:txBody>
@@ -4874,7 +4974,375 @@
                           <a:latin typeface="Times New Roman" panose="02020603050405020304" pitchFamily="18" charset="0"/>
                           <a:cs typeface="Times New Roman" panose="02020603050405020304" pitchFamily="18" charset="0"/>
                         </a:rPr>
-                        <a:t>All*</a:t>
+                        <a:t>MAC/Mab. (+) </a:t>
+                      </a:r>
+                      <a:r>
+                        <a:rPr lang="en-US" sz="1800" dirty="0" smtClean="0">
+                          <a:solidFill>
+                            <a:schemeClr val="tx1"/>
+                          </a:solidFill>
+                          <a:latin typeface="Times New Roman" panose="02020603050405020304" pitchFamily="18" charset="0"/>
+                          <a:cs typeface="Times New Roman" panose="02020603050405020304" pitchFamily="18" charset="0"/>
+                        </a:rPr>
+                        <a:t>only</a:t>
+                      </a:r>
+                      <a:endParaRPr lang="en-US" sz="1800" dirty="0">
+                        <a:solidFill>
+                          <a:schemeClr val="tx1"/>
+                        </a:solidFill>
+                        <a:latin typeface="Times New Roman" panose="02020603050405020304" pitchFamily="18" charset="0"/>
+                        <a:cs typeface="Times New Roman" panose="02020603050405020304" pitchFamily="18" charset="0"/>
+                      </a:endParaRPr>
+                    </a:p>
+                  </a:txBody>
+                  <a:tcPr anchor="ctr">
+                    <a:lnL w="12700" cap="flat" cmpd="sng" algn="ctr">
+                      <a:solidFill>
+                        <a:schemeClr val="tx1"/>
+                      </a:solidFill>
+                      <a:prstDash val="solid"/>
+                      <a:round/>
+                      <a:headEnd type="none" w="med" len="med"/>
+                      <a:tailEnd type="none" w="med" len="med"/>
+                    </a:lnL>
+                    <a:lnR w="12700" cap="flat" cmpd="sng" algn="ctr">
+                      <a:solidFill>
+                        <a:schemeClr val="tx1"/>
+                      </a:solidFill>
+                      <a:prstDash val="solid"/>
+                      <a:round/>
+                      <a:headEnd type="none" w="med" len="med"/>
+                      <a:tailEnd type="none" w="med" len="med"/>
+                    </a:lnR>
+                    <a:lnT w="12700" cap="flat" cmpd="sng" algn="ctr">
+                      <a:solidFill>
+                        <a:schemeClr val="tx1"/>
+                      </a:solidFill>
+                      <a:prstDash val="solid"/>
+                      <a:round/>
+                      <a:headEnd type="none" w="med" len="med"/>
+                      <a:tailEnd type="none" w="med" len="med"/>
+                    </a:lnT>
+                    <a:lnB w="12700" cap="flat" cmpd="sng" algn="ctr">
+                      <a:solidFill>
+                        <a:schemeClr val="tx1"/>
+                      </a:solidFill>
+                      <a:prstDash val="solid"/>
+                      <a:round/>
+                      <a:headEnd type="none" w="med" len="med"/>
+                      <a:tailEnd type="none" w="med" len="med"/>
+                    </a:lnB>
+                    <a:noFill/>
+                  </a:tcPr>
+                </a:tc>
+                <a:extLst>
+                  <a:ext uri="{0D108BD9-81ED-4DB2-BD59-A6C34878D82A}">
+                    <a16:rowId xmlns:a16="http://schemas.microsoft.com/office/drawing/2014/main" val="2538788687"/>
+                  </a:ext>
+                </a:extLst>
+              </a:tr>
+              <a:tr h="370840">
+                <a:tc>
+                  <a:txBody>
+                    <a:bodyPr/>
+                    <a:lstStyle/>
+                    <a:p>
+                      <a:pPr algn="ctr"/>
+                      <a:r>
+                        <a:rPr lang="en-US" sz="1800" b="1" dirty="0" smtClean="0">
+                          <a:solidFill>
+                            <a:schemeClr val="tx1"/>
+                          </a:solidFill>
+                          <a:latin typeface="Times New Roman" panose="02020603050405020304" pitchFamily="18" charset="0"/>
+                          <a:cs typeface="Times New Roman" panose="02020603050405020304" pitchFamily="18" charset="0"/>
+                        </a:rPr>
+                        <a:t>Infect-All </a:t>
+                      </a:r>
+                      <a:r>
+                        <a:rPr lang="en-US" sz="1800" b="1" dirty="0">
+                          <a:solidFill>
+                            <a:schemeClr val="tx1"/>
+                          </a:solidFill>
+                          <a:latin typeface="Times New Roman" panose="02020603050405020304" pitchFamily="18" charset="0"/>
+                          <a:cs typeface="Times New Roman" panose="02020603050405020304" pitchFamily="18" charset="0"/>
+                        </a:rPr>
+                        <a:t>(3)</a:t>
+                      </a:r>
+                    </a:p>
+                  </a:txBody>
+                  <a:tcPr anchor="ctr">
+                    <a:lnL w="12700" cap="flat" cmpd="sng" algn="ctr">
+                      <a:solidFill>
+                        <a:schemeClr val="tx1"/>
+                      </a:solidFill>
+                      <a:prstDash val="solid"/>
+                      <a:round/>
+                      <a:headEnd type="none" w="med" len="med"/>
+                      <a:tailEnd type="none" w="med" len="med"/>
+                    </a:lnL>
+                    <a:lnR w="12700" cap="flat" cmpd="sng" algn="ctr">
+                      <a:solidFill>
+                        <a:schemeClr val="tx1"/>
+                      </a:solidFill>
+                      <a:prstDash val="solid"/>
+                      <a:round/>
+                      <a:headEnd type="none" w="med" len="med"/>
+                      <a:tailEnd type="none" w="med" len="med"/>
+                    </a:lnR>
+                    <a:lnT w="12700" cap="flat" cmpd="sng" algn="ctr">
+                      <a:solidFill>
+                        <a:schemeClr val="tx1"/>
+                      </a:solidFill>
+                      <a:prstDash val="solid"/>
+                      <a:round/>
+                      <a:headEnd type="none" w="med" len="med"/>
+                      <a:tailEnd type="none" w="med" len="med"/>
+                    </a:lnT>
+                    <a:lnB w="12700" cap="flat" cmpd="sng" algn="ctr">
+                      <a:solidFill>
+                        <a:schemeClr val="tx1"/>
+                      </a:solidFill>
+                      <a:prstDash val="solid"/>
+                      <a:round/>
+                      <a:headEnd type="none" w="med" len="med"/>
+                      <a:tailEnd type="none" w="med" len="med"/>
+                    </a:lnB>
+                    <a:noFill/>
+                  </a:tcPr>
+                </a:tc>
+                <a:tc>
+                  <a:txBody>
+                    <a:bodyPr/>
+                    <a:lstStyle/>
+                    <a:p>
+                      <a:pPr algn="ctr"/>
+                      <a:r>
+                        <a:rPr lang="en-US" sz="1800" dirty="0" smtClean="0">
+                          <a:solidFill>
+                            <a:schemeClr val="tx1"/>
+                          </a:solidFill>
+                          <a:latin typeface="Times New Roman" panose="02020603050405020304" pitchFamily="18" charset="0"/>
+                          <a:cs typeface="Times New Roman" panose="02020603050405020304" pitchFamily="18" charset="0"/>
+                        </a:rPr>
+                        <a:t>Pre/Post </a:t>
+                      </a:r>
+                      <a:r>
+                        <a:rPr lang="en-US" sz="1800" dirty="0">
+                          <a:solidFill>
+                            <a:schemeClr val="tx1"/>
+                          </a:solidFill>
+                          <a:latin typeface="Times New Roman" panose="02020603050405020304" pitchFamily="18" charset="0"/>
+                          <a:cs typeface="Times New Roman" panose="02020603050405020304" pitchFamily="18" charset="0"/>
+                        </a:rPr>
+                        <a:t>infection</a:t>
+                      </a:r>
+                    </a:p>
+                  </a:txBody>
+                  <a:tcPr anchor="ctr">
+                    <a:lnL w="12700" cap="flat" cmpd="sng" algn="ctr">
+                      <a:solidFill>
+                        <a:schemeClr val="tx1"/>
+                      </a:solidFill>
+                      <a:prstDash val="solid"/>
+                      <a:round/>
+                      <a:headEnd type="none" w="med" len="med"/>
+                      <a:tailEnd type="none" w="med" len="med"/>
+                    </a:lnL>
+                    <a:lnR w="12700" cap="flat" cmpd="sng" algn="ctr">
+                      <a:solidFill>
+                        <a:schemeClr val="tx1"/>
+                      </a:solidFill>
+                      <a:prstDash val="solid"/>
+                      <a:round/>
+                      <a:headEnd type="none" w="med" len="med"/>
+                      <a:tailEnd type="none" w="med" len="med"/>
+                    </a:lnR>
+                    <a:lnT w="12700" cap="flat" cmpd="sng" algn="ctr">
+                      <a:solidFill>
+                        <a:schemeClr val="tx1"/>
+                      </a:solidFill>
+                      <a:prstDash val="solid"/>
+                      <a:round/>
+                      <a:headEnd type="none" w="med" len="med"/>
+                      <a:tailEnd type="none" w="med" len="med"/>
+                    </a:lnT>
+                    <a:lnB w="12700" cap="flat" cmpd="sng" algn="ctr">
+                      <a:solidFill>
+                        <a:schemeClr val="tx1"/>
+                      </a:solidFill>
+                      <a:prstDash val="solid"/>
+                      <a:round/>
+                      <a:headEnd type="none" w="med" len="med"/>
+                      <a:tailEnd type="none" w="med" len="med"/>
+                    </a:lnB>
+                    <a:noFill/>
+                  </a:tcPr>
+                </a:tc>
+                <a:tc>
+                  <a:txBody>
+                    <a:bodyPr/>
+                    <a:lstStyle/>
+                    <a:p>
+                      <a:pPr algn="ctr"/>
+                      <a:r>
+                        <a:rPr lang="en-US" sz="1800" dirty="0" smtClean="0">
+                          <a:solidFill>
+                            <a:schemeClr val="tx1"/>
+                          </a:solidFill>
+                          <a:latin typeface="Times New Roman" panose="02020603050405020304" pitchFamily="18" charset="0"/>
+                          <a:cs typeface="Times New Roman" panose="02020603050405020304" pitchFamily="18" charset="0"/>
+                        </a:rPr>
+                        <a:t>All</a:t>
+                      </a:r>
+                      <a:endParaRPr lang="en-US" sz="1800" dirty="0">
+                        <a:solidFill>
+                          <a:schemeClr val="tx1"/>
+                        </a:solidFill>
+                        <a:latin typeface="Times New Roman" panose="02020603050405020304" pitchFamily="18" charset="0"/>
+                        <a:cs typeface="Times New Roman" panose="02020603050405020304" pitchFamily="18" charset="0"/>
+                      </a:endParaRPr>
+                    </a:p>
+                  </a:txBody>
+                  <a:tcPr anchor="ctr">
+                    <a:lnL w="12700" cap="flat" cmpd="sng" algn="ctr">
+                      <a:solidFill>
+                        <a:schemeClr val="tx1"/>
+                      </a:solidFill>
+                      <a:prstDash val="solid"/>
+                      <a:round/>
+                      <a:headEnd type="none" w="med" len="med"/>
+                      <a:tailEnd type="none" w="med" len="med"/>
+                    </a:lnL>
+                    <a:lnR w="12700" cap="flat" cmpd="sng" algn="ctr">
+                      <a:solidFill>
+                        <a:schemeClr val="tx1"/>
+                      </a:solidFill>
+                      <a:prstDash val="solid"/>
+                      <a:round/>
+                      <a:headEnd type="none" w="med" len="med"/>
+                      <a:tailEnd type="none" w="med" len="med"/>
+                    </a:lnR>
+                    <a:lnT w="12700" cap="flat" cmpd="sng" algn="ctr">
+                      <a:solidFill>
+                        <a:schemeClr val="tx1"/>
+                      </a:solidFill>
+                      <a:prstDash val="solid"/>
+                      <a:round/>
+                      <a:headEnd type="none" w="med" len="med"/>
+                      <a:tailEnd type="none" w="med" len="med"/>
+                    </a:lnT>
+                    <a:lnB w="12700" cap="flat" cmpd="sng" algn="ctr">
+                      <a:solidFill>
+                        <a:schemeClr val="tx1"/>
+                      </a:solidFill>
+                      <a:prstDash val="solid"/>
+                      <a:round/>
+                      <a:headEnd type="none" w="med" len="med"/>
+                      <a:tailEnd type="none" w="med" len="med"/>
+                    </a:lnB>
+                    <a:noFill/>
+                  </a:tcPr>
+                </a:tc>
+                <a:extLst>
+                  <a:ext uri="{0D108BD9-81ED-4DB2-BD59-A6C34878D82A}">
+                    <a16:rowId xmlns:a16="http://schemas.microsoft.com/office/drawing/2014/main" val="2610292201"/>
+                  </a:ext>
+                </a:extLst>
+              </a:tr>
+              <a:tr h="370840">
+                <a:tc>
+                  <a:txBody>
+                    <a:bodyPr/>
+                    <a:lstStyle/>
+                    <a:p>
+                      <a:pPr algn="ctr"/>
+                      <a:r>
+                        <a:rPr lang="en-US" sz="1800" b="1" dirty="0" smtClean="0">
+                          <a:solidFill>
+                            <a:schemeClr val="tx1"/>
+                          </a:solidFill>
+                          <a:latin typeface="Times New Roman" panose="02020603050405020304" pitchFamily="18" charset="0"/>
+                          <a:cs typeface="Times New Roman" panose="02020603050405020304" pitchFamily="18" charset="0"/>
+                        </a:rPr>
+                        <a:t>Infect-Main </a:t>
+                      </a:r>
+                      <a:r>
+                        <a:rPr lang="en-US" sz="1800" b="1" dirty="0">
+                          <a:solidFill>
+                            <a:schemeClr val="tx1"/>
+                          </a:solidFill>
+                          <a:latin typeface="Times New Roman" panose="02020603050405020304" pitchFamily="18" charset="0"/>
+                          <a:cs typeface="Times New Roman" panose="02020603050405020304" pitchFamily="18" charset="0"/>
+                        </a:rPr>
+                        <a:t>(4)</a:t>
+                      </a:r>
+                    </a:p>
+                  </a:txBody>
+                  <a:tcPr anchor="ctr">
+                    <a:lnL w="12700" cap="flat" cmpd="sng" algn="ctr">
+                      <a:solidFill>
+                        <a:schemeClr val="tx1"/>
+                      </a:solidFill>
+                      <a:prstDash val="solid"/>
+                      <a:round/>
+                      <a:headEnd type="none" w="med" len="med"/>
+                      <a:tailEnd type="none" w="med" len="med"/>
+                    </a:lnL>
+                    <a:lnR w="12700" cap="flat" cmpd="sng" algn="ctr">
+                      <a:solidFill>
+                        <a:schemeClr val="tx1"/>
+                      </a:solidFill>
+                      <a:prstDash val="solid"/>
+                      <a:round/>
+                      <a:headEnd type="none" w="med" len="med"/>
+                      <a:tailEnd type="none" w="med" len="med"/>
+                    </a:lnR>
+                    <a:lnT w="12700" cap="flat" cmpd="sng" algn="ctr">
+                      <a:solidFill>
+                        <a:schemeClr val="tx1"/>
+                      </a:solidFill>
+                      <a:prstDash val="solid"/>
+                      <a:round/>
+                      <a:headEnd type="none" w="med" len="med"/>
+                      <a:tailEnd type="none" w="med" len="med"/>
+                    </a:lnT>
+                    <a:lnB w="12700" cap="flat" cmpd="sng" algn="ctr">
+                      <a:solidFill>
+                        <a:schemeClr val="tx1"/>
+                      </a:solidFill>
+                      <a:prstDash val="solid"/>
+                      <a:round/>
+                      <a:headEnd type="none" w="med" len="med"/>
+                      <a:tailEnd type="none" w="med" len="med"/>
+                    </a:lnB>
+                    <a:noFill/>
+                  </a:tcPr>
+                </a:tc>
+                <a:tc>
+                  <a:txBody>
+                    <a:bodyPr/>
+                    <a:lstStyle/>
+                    <a:p>
+                      <a:pPr algn="ctr"/>
+                      <a:r>
+                        <a:rPr lang="en-US" sz="1800" dirty="0" smtClean="0">
+                          <a:solidFill>
+                            <a:schemeClr val="tx1"/>
+                          </a:solidFill>
+                          <a:latin typeface="Times New Roman" panose="02020603050405020304" pitchFamily="18" charset="0"/>
+                          <a:cs typeface="Times New Roman" panose="02020603050405020304" pitchFamily="18" charset="0"/>
+                        </a:rPr>
+                        <a:t>Pre/Post </a:t>
+                      </a:r>
+                      <a:r>
+                        <a:rPr lang="en-US" sz="1800" dirty="0">
+                          <a:solidFill>
+                            <a:schemeClr val="tx1"/>
+                          </a:solidFill>
+                          <a:latin typeface="Times New Roman" panose="02020603050405020304" pitchFamily="18" charset="0"/>
+                          <a:cs typeface="Times New Roman" panose="02020603050405020304" pitchFamily="18" charset="0"/>
+                        </a:rPr>
+                        <a:t>infection</a:t>
                       </a:r>
                     </a:p>
                   </a:txBody>
@@ -4932,957 +5400,25 @@
                           <a:latin typeface="Times New Roman" panose="02020603050405020304" pitchFamily="18" charset="0"/>
                           <a:cs typeface="Times New Roman" panose="02020603050405020304" pitchFamily="18" charset="0"/>
                         </a:rPr>
-                        <a:t>Yes</a:t>
+                        <a:t>MAC/Mab. (+) </a:t>
                       </a:r>
-                    </a:p>
-                  </a:txBody>
-                  <a:tcPr anchor="ctr">
-                    <a:lnL w="12700" cap="flat" cmpd="sng" algn="ctr">
-                      <a:solidFill>
-                        <a:schemeClr val="tx1"/>
-                      </a:solidFill>
-                      <a:prstDash val="solid"/>
-                      <a:round/>
-                      <a:headEnd type="none" w="med" len="med"/>
-                      <a:tailEnd type="none" w="med" len="med"/>
-                    </a:lnL>
-                    <a:lnR w="12700" cap="flat" cmpd="sng" algn="ctr">
-                      <a:solidFill>
-                        <a:schemeClr val="tx1"/>
-                      </a:solidFill>
-                      <a:prstDash val="solid"/>
-                      <a:round/>
-                      <a:headEnd type="none" w="med" len="med"/>
-                      <a:tailEnd type="none" w="med" len="med"/>
-                    </a:lnR>
-                    <a:lnT w="12700" cap="flat" cmpd="sng" algn="ctr">
-                      <a:solidFill>
-                        <a:schemeClr val="tx1"/>
-                      </a:solidFill>
-                      <a:prstDash val="solid"/>
-                      <a:round/>
-                      <a:headEnd type="none" w="med" len="med"/>
-                      <a:tailEnd type="none" w="med" len="med"/>
-                    </a:lnT>
-                    <a:lnB w="12700" cap="flat" cmpd="sng" algn="ctr">
-                      <a:solidFill>
-                        <a:schemeClr val="tx1"/>
-                      </a:solidFill>
-                      <a:prstDash val="solid"/>
-                      <a:round/>
-                      <a:headEnd type="none" w="med" len="med"/>
-                      <a:tailEnd type="none" w="med" len="med"/>
-                    </a:lnB>
-                    <a:noFill/>
-                  </a:tcPr>
-                </a:tc>
-                <a:tc>
-                  <a:txBody>
-                    <a:bodyPr/>
-                    <a:lstStyle/>
-                    <a:p>
-                      <a:pPr algn="ctr"/>
                       <a:r>
-                        <a:rPr lang="en-US" sz="1800" dirty="0">
+                        <a:rPr lang="en-US" sz="1800" dirty="0" smtClean="0">
                           <a:solidFill>
                             <a:schemeClr val="tx1"/>
                           </a:solidFill>
                           <a:latin typeface="Times New Roman" panose="02020603050405020304" pitchFamily="18" charset="0"/>
                           <a:cs typeface="Times New Roman" panose="02020603050405020304" pitchFamily="18" charset="0"/>
                         </a:rPr>
-                        <a:t>Yes</a:t>
+                        <a:t>only</a:t>
                       </a:r>
-                    </a:p>
-                  </a:txBody>
-                  <a:tcPr anchor="ctr">
-                    <a:lnL w="12700" cap="flat" cmpd="sng" algn="ctr">
-                      <a:solidFill>
-                        <a:schemeClr val="tx1"/>
-                      </a:solidFill>
-                      <a:prstDash val="solid"/>
-                      <a:round/>
-                      <a:headEnd type="none" w="med" len="med"/>
-                      <a:tailEnd type="none" w="med" len="med"/>
-                    </a:lnL>
-                    <a:lnR w="12700" cap="flat" cmpd="sng" algn="ctr">
-                      <a:solidFill>
-                        <a:schemeClr val="tx1"/>
-                      </a:solidFill>
-                      <a:prstDash val="solid"/>
-                      <a:round/>
-                      <a:headEnd type="none" w="med" len="med"/>
-                      <a:tailEnd type="none" w="med" len="med"/>
-                    </a:lnR>
-                    <a:lnT w="12700" cap="flat" cmpd="sng" algn="ctr">
-                      <a:solidFill>
-                        <a:schemeClr val="tx1"/>
-                      </a:solidFill>
-                      <a:prstDash val="solid"/>
-                      <a:round/>
-                      <a:headEnd type="none" w="med" len="med"/>
-                      <a:tailEnd type="none" w="med" len="med"/>
-                    </a:lnT>
-                    <a:lnB w="12700" cap="flat" cmpd="sng" algn="ctr">
-                      <a:solidFill>
-                        <a:schemeClr val="tx1"/>
-                      </a:solidFill>
-                      <a:prstDash val="solid"/>
-                      <a:round/>
-                      <a:headEnd type="none" w="med" len="med"/>
-                      <a:tailEnd type="none" w="med" len="med"/>
-                    </a:lnB>
-                    <a:noFill/>
-                  </a:tcPr>
-                </a:tc>
-                <a:extLst>
-                  <a:ext uri="{0D108BD9-81ED-4DB2-BD59-A6C34878D82A}">
-                    <a16:rowId xmlns:a16="http://schemas.microsoft.com/office/drawing/2014/main" val="3600208251"/>
-                  </a:ext>
-                </a:extLst>
-              </a:tr>
-              <a:tr h="370840">
-                <a:tc>
-                  <a:txBody>
-                    <a:bodyPr/>
-                    <a:lstStyle/>
-                    <a:p>
-                      <a:pPr algn="ctr"/>
-                      <a:r>
-                        <a:rPr lang="en-US" sz="1800" b="1" dirty="0">
-                          <a:solidFill>
-                            <a:schemeClr val="tx1"/>
-                          </a:solidFill>
-                          <a:latin typeface="Times New Roman" panose="02020603050405020304" pitchFamily="18" charset="0"/>
-                          <a:cs typeface="Times New Roman" panose="02020603050405020304" pitchFamily="18" charset="0"/>
-                        </a:rPr>
-                        <a:t>Disease-Main-SD (2)</a:t>
-                      </a:r>
-                    </a:p>
-                  </a:txBody>
-                  <a:tcPr anchor="ctr">
-                    <a:lnL w="12700" cap="flat" cmpd="sng" algn="ctr">
-                      <a:solidFill>
-                        <a:schemeClr val="tx1"/>
-                      </a:solidFill>
-                      <a:prstDash val="solid"/>
-                      <a:round/>
-                      <a:headEnd type="none" w="med" len="med"/>
-                      <a:tailEnd type="none" w="med" len="med"/>
-                    </a:lnL>
-                    <a:lnR w="12700" cap="flat" cmpd="sng" algn="ctr">
-                      <a:solidFill>
-                        <a:schemeClr val="tx1"/>
-                      </a:solidFill>
-                      <a:prstDash val="solid"/>
-                      <a:round/>
-                      <a:headEnd type="none" w="med" len="med"/>
-                      <a:tailEnd type="none" w="med" len="med"/>
-                    </a:lnR>
-                    <a:lnT w="12700" cap="flat" cmpd="sng" algn="ctr">
-                      <a:solidFill>
-                        <a:schemeClr val="tx1"/>
-                      </a:solidFill>
-                      <a:prstDash val="solid"/>
-                      <a:round/>
-                      <a:headEnd type="none" w="med" len="med"/>
-                      <a:tailEnd type="none" w="med" len="med"/>
-                    </a:lnT>
-                    <a:lnB w="12700" cap="flat" cmpd="sng" algn="ctr">
-                      <a:solidFill>
-                        <a:schemeClr val="tx1"/>
-                      </a:solidFill>
-                      <a:prstDash val="solid"/>
-                      <a:round/>
-                      <a:headEnd type="none" w="med" len="med"/>
-                      <a:tailEnd type="none" w="med" len="med"/>
-                    </a:lnB>
-                    <a:noFill/>
-                  </a:tcPr>
-                </a:tc>
-                <a:tc>
-                  <a:txBody>
-                    <a:bodyPr/>
-                    <a:lstStyle/>
-                    <a:p>
-                      <a:pPr algn="ctr"/>
-                      <a:r>
-                        <a:rPr lang="en-US" sz="1800" dirty="0">
-                          <a:solidFill>
-                            <a:schemeClr val="tx1"/>
-                          </a:solidFill>
-                          <a:latin typeface="Times New Roman" panose="02020603050405020304" pitchFamily="18" charset="0"/>
-                          <a:cs typeface="Times New Roman" panose="02020603050405020304" pitchFamily="18" charset="0"/>
-                        </a:rPr>
-                        <a:t>NTM disease</a:t>
-                      </a:r>
-                    </a:p>
-                  </a:txBody>
-                  <a:tcPr anchor="ctr">
-                    <a:lnL w="12700" cap="flat" cmpd="sng" algn="ctr">
-                      <a:solidFill>
-                        <a:schemeClr val="tx1"/>
-                      </a:solidFill>
-                      <a:prstDash val="solid"/>
-                      <a:round/>
-                      <a:headEnd type="none" w="med" len="med"/>
-                      <a:tailEnd type="none" w="med" len="med"/>
-                    </a:lnL>
-                    <a:lnR w="12700" cap="flat" cmpd="sng" algn="ctr">
-                      <a:solidFill>
-                        <a:schemeClr val="tx1"/>
-                      </a:solidFill>
-                      <a:prstDash val="solid"/>
-                      <a:round/>
-                      <a:headEnd type="none" w="med" len="med"/>
-                      <a:tailEnd type="none" w="med" len="med"/>
-                    </a:lnR>
-                    <a:lnT w="12700" cap="flat" cmpd="sng" algn="ctr">
-                      <a:solidFill>
-                        <a:schemeClr val="tx1"/>
-                      </a:solidFill>
-                      <a:prstDash val="solid"/>
-                      <a:round/>
-                      <a:headEnd type="none" w="med" len="med"/>
-                      <a:tailEnd type="none" w="med" len="med"/>
-                    </a:lnT>
-                    <a:lnB w="12700" cap="flat" cmpd="sng" algn="ctr">
-                      <a:solidFill>
-                        <a:schemeClr val="tx1"/>
-                      </a:solidFill>
-                      <a:prstDash val="solid"/>
-                      <a:round/>
-                      <a:headEnd type="none" w="med" len="med"/>
-                      <a:tailEnd type="none" w="med" len="med"/>
-                    </a:lnB>
-                    <a:noFill/>
-                  </a:tcPr>
-                </a:tc>
-                <a:tc>
-                  <a:txBody>
-                    <a:bodyPr/>
-                    <a:lstStyle/>
-                    <a:p>
-                      <a:pPr algn="ctr"/>
-                      <a:r>
-                        <a:rPr lang="en-US" sz="1800" dirty="0">
-                          <a:solidFill>
-                            <a:schemeClr val="tx1"/>
-                          </a:solidFill>
-                          <a:latin typeface="Times New Roman" panose="02020603050405020304" pitchFamily="18" charset="0"/>
-                          <a:cs typeface="Times New Roman" panose="02020603050405020304" pitchFamily="18" charset="0"/>
-                        </a:rPr>
-                        <a:t>MAC/Mab. (+) only*</a:t>
-                      </a:r>
-                    </a:p>
-                  </a:txBody>
-                  <a:tcPr anchor="ctr">
-                    <a:lnL w="12700" cap="flat" cmpd="sng" algn="ctr">
-                      <a:solidFill>
-                        <a:schemeClr val="tx1"/>
-                      </a:solidFill>
-                      <a:prstDash val="solid"/>
-                      <a:round/>
-                      <a:headEnd type="none" w="med" len="med"/>
-                      <a:tailEnd type="none" w="med" len="med"/>
-                    </a:lnL>
-                    <a:lnR w="12700" cap="flat" cmpd="sng" algn="ctr">
-                      <a:solidFill>
-                        <a:schemeClr val="tx1"/>
-                      </a:solidFill>
-                      <a:prstDash val="solid"/>
-                      <a:round/>
-                      <a:headEnd type="none" w="med" len="med"/>
-                      <a:tailEnd type="none" w="med" len="med"/>
-                    </a:lnR>
-                    <a:lnT w="12700" cap="flat" cmpd="sng" algn="ctr">
-                      <a:solidFill>
-                        <a:schemeClr val="tx1"/>
-                      </a:solidFill>
-                      <a:prstDash val="solid"/>
-                      <a:round/>
-                      <a:headEnd type="none" w="med" len="med"/>
-                      <a:tailEnd type="none" w="med" len="med"/>
-                    </a:lnT>
-                    <a:lnB w="12700" cap="flat" cmpd="sng" algn="ctr">
-                      <a:solidFill>
-                        <a:schemeClr val="tx1"/>
-                      </a:solidFill>
-                      <a:prstDash val="solid"/>
-                      <a:round/>
-                      <a:headEnd type="none" w="med" len="med"/>
-                      <a:tailEnd type="none" w="med" len="med"/>
-                    </a:lnB>
-                    <a:noFill/>
-                  </a:tcPr>
-                </a:tc>
-                <a:tc>
-                  <a:txBody>
-                    <a:bodyPr/>
-                    <a:lstStyle/>
-                    <a:p>
-                      <a:pPr algn="ctr"/>
-                      <a:r>
-                        <a:rPr lang="en-US" sz="1800" dirty="0">
-                          <a:solidFill>
-                            <a:schemeClr val="tx1"/>
-                          </a:solidFill>
-                          <a:latin typeface="Times New Roman" panose="02020603050405020304" pitchFamily="18" charset="0"/>
-                          <a:cs typeface="Times New Roman" panose="02020603050405020304" pitchFamily="18" charset="0"/>
-                        </a:rPr>
-                        <a:t>Yes</a:t>
-                      </a:r>
-                    </a:p>
-                  </a:txBody>
-                  <a:tcPr anchor="ctr">
-                    <a:lnL w="12700" cap="flat" cmpd="sng" algn="ctr">
-                      <a:solidFill>
-                        <a:schemeClr val="tx1"/>
-                      </a:solidFill>
-                      <a:prstDash val="solid"/>
-                      <a:round/>
-                      <a:headEnd type="none" w="med" len="med"/>
-                      <a:tailEnd type="none" w="med" len="med"/>
-                    </a:lnL>
-                    <a:lnR w="12700" cap="flat" cmpd="sng" algn="ctr">
-                      <a:solidFill>
-                        <a:schemeClr val="tx1"/>
-                      </a:solidFill>
-                      <a:prstDash val="solid"/>
-                      <a:round/>
-                      <a:headEnd type="none" w="med" len="med"/>
-                      <a:tailEnd type="none" w="med" len="med"/>
-                    </a:lnR>
-                    <a:lnT w="12700" cap="flat" cmpd="sng" algn="ctr">
-                      <a:solidFill>
-                        <a:schemeClr val="tx1"/>
-                      </a:solidFill>
-                      <a:prstDash val="solid"/>
-                      <a:round/>
-                      <a:headEnd type="none" w="med" len="med"/>
-                      <a:tailEnd type="none" w="med" len="med"/>
-                    </a:lnT>
-                    <a:lnB w="12700" cap="flat" cmpd="sng" algn="ctr">
-                      <a:solidFill>
-                        <a:schemeClr val="tx1"/>
-                      </a:solidFill>
-                      <a:prstDash val="solid"/>
-                      <a:round/>
-                      <a:headEnd type="none" w="med" len="med"/>
-                      <a:tailEnd type="none" w="med" len="med"/>
-                    </a:lnB>
-                    <a:noFill/>
-                  </a:tcPr>
-                </a:tc>
-                <a:tc>
-                  <a:txBody>
-                    <a:bodyPr/>
-                    <a:lstStyle/>
-                    <a:p>
-                      <a:pPr algn="ctr"/>
-                      <a:r>
-                        <a:rPr lang="en-US" sz="1800" dirty="0">
-                          <a:solidFill>
-                            <a:schemeClr val="tx1"/>
-                          </a:solidFill>
-                          <a:latin typeface="Times New Roman" panose="02020603050405020304" pitchFamily="18" charset="0"/>
-                          <a:cs typeface="Times New Roman" panose="02020603050405020304" pitchFamily="18" charset="0"/>
-                        </a:rPr>
-                        <a:t>Yes</a:t>
-                      </a:r>
-                    </a:p>
-                  </a:txBody>
-                  <a:tcPr anchor="ctr">
-                    <a:lnL w="12700" cap="flat" cmpd="sng" algn="ctr">
-                      <a:solidFill>
-                        <a:schemeClr val="tx1"/>
-                      </a:solidFill>
-                      <a:prstDash val="solid"/>
-                      <a:round/>
-                      <a:headEnd type="none" w="med" len="med"/>
-                      <a:tailEnd type="none" w="med" len="med"/>
-                    </a:lnL>
-                    <a:lnR w="12700" cap="flat" cmpd="sng" algn="ctr">
-                      <a:solidFill>
-                        <a:schemeClr val="tx1"/>
-                      </a:solidFill>
-                      <a:prstDash val="solid"/>
-                      <a:round/>
-                      <a:headEnd type="none" w="med" len="med"/>
-                      <a:tailEnd type="none" w="med" len="med"/>
-                    </a:lnR>
-                    <a:lnT w="12700" cap="flat" cmpd="sng" algn="ctr">
-                      <a:solidFill>
-                        <a:schemeClr val="tx1"/>
-                      </a:solidFill>
-                      <a:prstDash val="solid"/>
-                      <a:round/>
-                      <a:headEnd type="none" w="med" len="med"/>
-                      <a:tailEnd type="none" w="med" len="med"/>
-                    </a:lnT>
-                    <a:lnB w="12700" cap="flat" cmpd="sng" algn="ctr">
-                      <a:solidFill>
-                        <a:schemeClr val="tx1"/>
-                      </a:solidFill>
-                      <a:prstDash val="solid"/>
-                      <a:round/>
-                      <a:headEnd type="none" w="med" len="med"/>
-                      <a:tailEnd type="none" w="med" len="med"/>
-                    </a:lnB>
-                    <a:noFill/>
-                  </a:tcPr>
-                </a:tc>
-                <a:extLst>
-                  <a:ext uri="{0D108BD9-81ED-4DB2-BD59-A6C34878D82A}">
-                    <a16:rowId xmlns:a16="http://schemas.microsoft.com/office/drawing/2014/main" val="2538788687"/>
-                  </a:ext>
-                </a:extLst>
-              </a:tr>
-              <a:tr h="370840">
-                <a:tc>
-                  <a:txBody>
-                    <a:bodyPr/>
-                    <a:lstStyle/>
-                    <a:p>
-                      <a:pPr algn="ctr"/>
-                      <a:r>
-                        <a:rPr lang="en-US" sz="1800" b="1" dirty="0">
-                          <a:solidFill>
-                            <a:schemeClr val="tx1"/>
-                          </a:solidFill>
-                          <a:latin typeface="Times New Roman" panose="02020603050405020304" pitchFamily="18" charset="0"/>
-                          <a:cs typeface="Times New Roman" panose="02020603050405020304" pitchFamily="18" charset="0"/>
-                        </a:rPr>
-                        <a:t>Infect-All-SD (3)</a:t>
-                      </a:r>
-                    </a:p>
-                  </a:txBody>
-                  <a:tcPr anchor="ctr">
-                    <a:lnL w="12700" cap="flat" cmpd="sng" algn="ctr">
-                      <a:solidFill>
-                        <a:schemeClr val="tx1"/>
-                      </a:solidFill>
-                      <a:prstDash val="solid"/>
-                      <a:round/>
-                      <a:headEnd type="none" w="med" len="med"/>
-                      <a:tailEnd type="none" w="med" len="med"/>
-                    </a:lnL>
-                    <a:lnR w="12700" cap="flat" cmpd="sng" algn="ctr">
-                      <a:solidFill>
-                        <a:schemeClr val="tx1"/>
-                      </a:solidFill>
-                      <a:prstDash val="solid"/>
-                      <a:round/>
-                      <a:headEnd type="none" w="med" len="med"/>
-                      <a:tailEnd type="none" w="med" len="med"/>
-                    </a:lnR>
-                    <a:lnT w="12700" cap="flat" cmpd="sng" algn="ctr">
-                      <a:solidFill>
-                        <a:schemeClr val="tx1"/>
-                      </a:solidFill>
-                      <a:prstDash val="solid"/>
-                      <a:round/>
-                      <a:headEnd type="none" w="med" len="med"/>
-                      <a:tailEnd type="none" w="med" len="med"/>
-                    </a:lnT>
-                    <a:lnB w="12700" cap="flat" cmpd="sng" algn="ctr">
-                      <a:solidFill>
-                        <a:schemeClr val="tx1"/>
-                      </a:solidFill>
-                      <a:prstDash val="solid"/>
-                      <a:round/>
-                      <a:headEnd type="none" w="med" len="med"/>
-                      <a:tailEnd type="none" w="med" len="med"/>
-                    </a:lnB>
-                    <a:noFill/>
-                  </a:tcPr>
-                </a:tc>
-                <a:tc>
-                  <a:txBody>
-                    <a:bodyPr/>
-                    <a:lstStyle/>
-                    <a:p>
-                      <a:pPr algn="ctr"/>
-                      <a:r>
-                        <a:rPr lang="en-US" sz="1800" dirty="0">
-                          <a:solidFill>
-                            <a:schemeClr val="tx1"/>
-                          </a:solidFill>
-                          <a:latin typeface="Times New Roman" panose="02020603050405020304" pitchFamily="18" charset="0"/>
-                          <a:cs typeface="Times New Roman" panose="02020603050405020304" pitchFamily="18" charset="0"/>
-                        </a:rPr>
-                        <a:t>NTM infection</a:t>
-                      </a:r>
-                    </a:p>
-                  </a:txBody>
-                  <a:tcPr anchor="ctr">
-                    <a:lnL w="12700" cap="flat" cmpd="sng" algn="ctr">
-                      <a:solidFill>
-                        <a:schemeClr val="tx1"/>
-                      </a:solidFill>
-                      <a:prstDash val="solid"/>
-                      <a:round/>
-                      <a:headEnd type="none" w="med" len="med"/>
-                      <a:tailEnd type="none" w="med" len="med"/>
-                    </a:lnL>
-                    <a:lnR w="12700" cap="flat" cmpd="sng" algn="ctr">
-                      <a:solidFill>
-                        <a:schemeClr val="tx1"/>
-                      </a:solidFill>
-                      <a:prstDash val="solid"/>
-                      <a:round/>
-                      <a:headEnd type="none" w="med" len="med"/>
-                      <a:tailEnd type="none" w="med" len="med"/>
-                    </a:lnR>
-                    <a:lnT w="12700" cap="flat" cmpd="sng" algn="ctr">
-                      <a:solidFill>
-                        <a:schemeClr val="tx1"/>
-                      </a:solidFill>
-                      <a:prstDash val="solid"/>
-                      <a:round/>
-                      <a:headEnd type="none" w="med" len="med"/>
-                      <a:tailEnd type="none" w="med" len="med"/>
-                    </a:lnT>
-                    <a:lnB w="12700" cap="flat" cmpd="sng" algn="ctr">
-                      <a:solidFill>
-                        <a:schemeClr val="tx1"/>
-                      </a:solidFill>
-                      <a:prstDash val="solid"/>
-                      <a:round/>
-                      <a:headEnd type="none" w="med" len="med"/>
-                      <a:tailEnd type="none" w="med" len="med"/>
-                    </a:lnB>
-                    <a:noFill/>
-                  </a:tcPr>
-                </a:tc>
-                <a:tc>
-                  <a:txBody>
-                    <a:bodyPr/>
-                    <a:lstStyle/>
-                    <a:p>
-                      <a:pPr algn="ctr"/>
-                      <a:r>
-                        <a:rPr lang="en-US" sz="1800" dirty="0">
-                          <a:solidFill>
-                            <a:schemeClr val="tx1"/>
-                          </a:solidFill>
-                          <a:latin typeface="Times New Roman" panose="02020603050405020304" pitchFamily="18" charset="0"/>
-                          <a:cs typeface="Times New Roman" panose="02020603050405020304" pitchFamily="18" charset="0"/>
-                        </a:rPr>
-                        <a:t>All*</a:t>
-                      </a:r>
-                    </a:p>
-                  </a:txBody>
-                  <a:tcPr anchor="ctr">
-                    <a:lnL w="12700" cap="flat" cmpd="sng" algn="ctr">
-                      <a:solidFill>
-                        <a:schemeClr val="tx1"/>
-                      </a:solidFill>
-                      <a:prstDash val="solid"/>
-                      <a:round/>
-                      <a:headEnd type="none" w="med" len="med"/>
-                      <a:tailEnd type="none" w="med" len="med"/>
-                    </a:lnL>
-                    <a:lnR w="12700" cap="flat" cmpd="sng" algn="ctr">
-                      <a:solidFill>
-                        <a:schemeClr val="tx1"/>
-                      </a:solidFill>
-                      <a:prstDash val="solid"/>
-                      <a:round/>
-                      <a:headEnd type="none" w="med" len="med"/>
-                      <a:tailEnd type="none" w="med" len="med"/>
-                    </a:lnR>
-                    <a:lnT w="12700" cap="flat" cmpd="sng" algn="ctr">
-                      <a:solidFill>
-                        <a:schemeClr val="tx1"/>
-                      </a:solidFill>
-                      <a:prstDash val="solid"/>
-                      <a:round/>
-                      <a:headEnd type="none" w="med" len="med"/>
-                      <a:tailEnd type="none" w="med" len="med"/>
-                    </a:lnT>
-                    <a:lnB w="12700" cap="flat" cmpd="sng" algn="ctr">
-                      <a:solidFill>
-                        <a:schemeClr val="tx1"/>
-                      </a:solidFill>
-                      <a:prstDash val="solid"/>
-                      <a:round/>
-                      <a:headEnd type="none" w="med" len="med"/>
-                      <a:tailEnd type="none" w="med" len="med"/>
-                    </a:lnB>
-                    <a:noFill/>
-                  </a:tcPr>
-                </a:tc>
-                <a:tc>
-                  <a:txBody>
-                    <a:bodyPr/>
-                    <a:lstStyle/>
-                    <a:p>
-                      <a:pPr algn="ctr"/>
-                      <a:r>
-                        <a:rPr lang="en-US" sz="1800" dirty="0">
-                          <a:solidFill>
-                            <a:schemeClr val="tx1"/>
-                          </a:solidFill>
-                          <a:latin typeface="Times New Roman" panose="02020603050405020304" pitchFamily="18" charset="0"/>
-                          <a:cs typeface="Times New Roman" panose="02020603050405020304" pitchFamily="18" charset="0"/>
-                        </a:rPr>
-                        <a:t>Yes</a:t>
-                      </a:r>
-                    </a:p>
-                  </a:txBody>
-                  <a:tcPr anchor="ctr">
-                    <a:lnL w="12700" cap="flat" cmpd="sng" algn="ctr">
-                      <a:solidFill>
-                        <a:schemeClr val="tx1"/>
-                      </a:solidFill>
-                      <a:prstDash val="solid"/>
-                      <a:round/>
-                      <a:headEnd type="none" w="med" len="med"/>
-                      <a:tailEnd type="none" w="med" len="med"/>
-                    </a:lnL>
-                    <a:lnR w="12700" cap="flat" cmpd="sng" algn="ctr">
-                      <a:solidFill>
-                        <a:schemeClr val="tx1"/>
-                      </a:solidFill>
-                      <a:prstDash val="solid"/>
-                      <a:round/>
-                      <a:headEnd type="none" w="med" len="med"/>
-                      <a:tailEnd type="none" w="med" len="med"/>
-                    </a:lnR>
-                    <a:lnT w="12700" cap="flat" cmpd="sng" algn="ctr">
-                      <a:solidFill>
-                        <a:schemeClr val="tx1"/>
-                      </a:solidFill>
-                      <a:prstDash val="solid"/>
-                      <a:round/>
-                      <a:headEnd type="none" w="med" len="med"/>
-                      <a:tailEnd type="none" w="med" len="med"/>
-                    </a:lnT>
-                    <a:lnB w="12700" cap="flat" cmpd="sng" algn="ctr">
-                      <a:solidFill>
-                        <a:schemeClr val="tx1"/>
-                      </a:solidFill>
-                      <a:prstDash val="solid"/>
-                      <a:round/>
-                      <a:headEnd type="none" w="med" len="med"/>
-                      <a:tailEnd type="none" w="med" len="med"/>
-                    </a:lnB>
-                    <a:noFill/>
-                  </a:tcPr>
-                </a:tc>
-                <a:tc>
-                  <a:txBody>
-                    <a:bodyPr/>
-                    <a:lstStyle/>
-                    <a:p>
-                      <a:pPr algn="ctr"/>
-                      <a:r>
-                        <a:rPr lang="en-US" sz="1800" dirty="0">
-                          <a:solidFill>
-                            <a:schemeClr val="tx1"/>
-                          </a:solidFill>
-                          <a:latin typeface="Times New Roman" panose="02020603050405020304" pitchFamily="18" charset="0"/>
-                          <a:cs typeface="Times New Roman" panose="02020603050405020304" pitchFamily="18" charset="0"/>
-                        </a:rPr>
-                        <a:t>Yes</a:t>
-                      </a:r>
-                    </a:p>
-                  </a:txBody>
-                  <a:tcPr anchor="ctr">
-                    <a:lnL w="12700" cap="flat" cmpd="sng" algn="ctr">
-                      <a:solidFill>
-                        <a:schemeClr val="tx1"/>
-                      </a:solidFill>
-                      <a:prstDash val="solid"/>
-                      <a:round/>
-                      <a:headEnd type="none" w="med" len="med"/>
-                      <a:tailEnd type="none" w="med" len="med"/>
-                    </a:lnL>
-                    <a:lnR w="12700" cap="flat" cmpd="sng" algn="ctr">
-                      <a:solidFill>
-                        <a:schemeClr val="tx1"/>
-                      </a:solidFill>
-                      <a:prstDash val="solid"/>
-                      <a:round/>
-                      <a:headEnd type="none" w="med" len="med"/>
-                      <a:tailEnd type="none" w="med" len="med"/>
-                    </a:lnR>
-                    <a:lnT w="12700" cap="flat" cmpd="sng" algn="ctr">
-                      <a:solidFill>
-                        <a:schemeClr val="tx1"/>
-                      </a:solidFill>
-                      <a:prstDash val="solid"/>
-                      <a:round/>
-                      <a:headEnd type="none" w="med" len="med"/>
-                      <a:tailEnd type="none" w="med" len="med"/>
-                    </a:lnT>
-                    <a:lnB w="12700" cap="flat" cmpd="sng" algn="ctr">
-                      <a:solidFill>
-                        <a:schemeClr val="tx1"/>
-                      </a:solidFill>
-                      <a:prstDash val="solid"/>
-                      <a:round/>
-                      <a:headEnd type="none" w="med" len="med"/>
-                      <a:tailEnd type="none" w="med" len="med"/>
-                    </a:lnB>
-                    <a:noFill/>
-                  </a:tcPr>
-                </a:tc>
-                <a:extLst>
-                  <a:ext uri="{0D108BD9-81ED-4DB2-BD59-A6C34878D82A}">
-                    <a16:rowId xmlns:a16="http://schemas.microsoft.com/office/drawing/2014/main" val="2610292201"/>
-                  </a:ext>
-                </a:extLst>
-              </a:tr>
-              <a:tr h="370840">
-                <a:tc>
-                  <a:txBody>
-                    <a:bodyPr/>
-                    <a:lstStyle/>
-                    <a:p>
-                      <a:pPr algn="ctr"/>
-                      <a:r>
-                        <a:rPr lang="en-US" sz="1800" b="1" dirty="0">
-                          <a:solidFill>
-                            <a:schemeClr val="tx1"/>
-                          </a:solidFill>
-                          <a:latin typeface="Times New Roman" panose="02020603050405020304" pitchFamily="18" charset="0"/>
-                          <a:cs typeface="Times New Roman" panose="02020603050405020304" pitchFamily="18" charset="0"/>
-                        </a:rPr>
-                        <a:t>Infect-Main-SD (4)</a:t>
-                      </a:r>
-                    </a:p>
-                  </a:txBody>
-                  <a:tcPr anchor="ctr">
-                    <a:lnL w="12700" cap="flat" cmpd="sng" algn="ctr">
-                      <a:solidFill>
-                        <a:schemeClr val="tx1"/>
-                      </a:solidFill>
-                      <a:prstDash val="solid"/>
-                      <a:round/>
-                      <a:headEnd type="none" w="med" len="med"/>
-                      <a:tailEnd type="none" w="med" len="med"/>
-                    </a:lnL>
-                    <a:lnR w="12700" cap="flat" cmpd="sng" algn="ctr">
-                      <a:solidFill>
-                        <a:schemeClr val="tx1"/>
-                      </a:solidFill>
-                      <a:prstDash val="solid"/>
-                      <a:round/>
-                      <a:headEnd type="none" w="med" len="med"/>
-                      <a:tailEnd type="none" w="med" len="med"/>
-                    </a:lnR>
-                    <a:lnT w="12700" cap="flat" cmpd="sng" algn="ctr">
-                      <a:solidFill>
-                        <a:schemeClr val="tx1"/>
-                      </a:solidFill>
-                      <a:prstDash val="solid"/>
-                      <a:round/>
-                      <a:headEnd type="none" w="med" len="med"/>
-                      <a:tailEnd type="none" w="med" len="med"/>
-                    </a:lnT>
-                    <a:lnB w="12700" cap="flat" cmpd="sng" algn="ctr">
-                      <a:solidFill>
-                        <a:schemeClr val="tx1"/>
-                      </a:solidFill>
-                      <a:prstDash val="solid"/>
-                      <a:round/>
-                      <a:headEnd type="none" w="med" len="med"/>
-                      <a:tailEnd type="none" w="med" len="med"/>
-                    </a:lnB>
-                    <a:noFill/>
-                  </a:tcPr>
-                </a:tc>
-                <a:tc>
-                  <a:txBody>
-                    <a:bodyPr/>
-                    <a:lstStyle/>
-                    <a:p>
-                      <a:pPr algn="ctr"/>
-                      <a:r>
-                        <a:rPr lang="en-US" sz="1800" dirty="0">
-                          <a:solidFill>
-                            <a:schemeClr val="tx1"/>
-                          </a:solidFill>
-                          <a:latin typeface="Times New Roman" panose="02020603050405020304" pitchFamily="18" charset="0"/>
-                          <a:cs typeface="Times New Roman" panose="02020603050405020304" pitchFamily="18" charset="0"/>
-                        </a:rPr>
-                        <a:t>NTM infection</a:t>
-                      </a:r>
-                    </a:p>
-                  </a:txBody>
-                  <a:tcPr anchor="ctr">
-                    <a:lnL w="12700" cap="flat" cmpd="sng" algn="ctr">
-                      <a:solidFill>
-                        <a:schemeClr val="tx1"/>
-                      </a:solidFill>
-                      <a:prstDash val="solid"/>
-                      <a:round/>
-                      <a:headEnd type="none" w="med" len="med"/>
-                      <a:tailEnd type="none" w="med" len="med"/>
-                    </a:lnL>
-                    <a:lnR w="12700" cap="flat" cmpd="sng" algn="ctr">
-                      <a:solidFill>
-                        <a:schemeClr val="tx1"/>
-                      </a:solidFill>
-                      <a:prstDash val="solid"/>
-                      <a:round/>
-                      <a:headEnd type="none" w="med" len="med"/>
-                      <a:tailEnd type="none" w="med" len="med"/>
-                    </a:lnR>
-                    <a:lnT w="12700" cap="flat" cmpd="sng" algn="ctr">
-                      <a:solidFill>
-                        <a:schemeClr val="tx1"/>
-                      </a:solidFill>
-                      <a:prstDash val="solid"/>
-                      <a:round/>
-                      <a:headEnd type="none" w="med" len="med"/>
-                      <a:tailEnd type="none" w="med" len="med"/>
-                    </a:lnT>
-                    <a:lnB w="12700" cap="flat" cmpd="sng" algn="ctr">
-                      <a:solidFill>
-                        <a:schemeClr val="tx1"/>
-                      </a:solidFill>
-                      <a:prstDash val="solid"/>
-                      <a:round/>
-                      <a:headEnd type="none" w="med" len="med"/>
-                      <a:tailEnd type="none" w="med" len="med"/>
-                    </a:lnB>
-                    <a:noFill/>
-                  </a:tcPr>
-                </a:tc>
-                <a:tc>
-                  <a:txBody>
-                    <a:bodyPr/>
-                    <a:lstStyle/>
-                    <a:p>
-                      <a:pPr algn="ctr"/>
-                      <a:r>
-                        <a:rPr lang="en-US" sz="1800" dirty="0">
-                          <a:solidFill>
-                            <a:schemeClr val="tx1"/>
-                          </a:solidFill>
-                          <a:latin typeface="Times New Roman" panose="02020603050405020304" pitchFamily="18" charset="0"/>
-                          <a:cs typeface="Times New Roman" panose="02020603050405020304" pitchFamily="18" charset="0"/>
-                        </a:rPr>
-                        <a:t>MAC/Mab. (+) only*</a:t>
-                      </a:r>
-                    </a:p>
-                  </a:txBody>
-                  <a:tcPr anchor="ctr">
-                    <a:lnL w="12700" cap="flat" cmpd="sng" algn="ctr">
-                      <a:solidFill>
-                        <a:schemeClr val="tx1"/>
-                      </a:solidFill>
-                      <a:prstDash val="solid"/>
-                      <a:round/>
-                      <a:headEnd type="none" w="med" len="med"/>
-                      <a:tailEnd type="none" w="med" len="med"/>
-                    </a:lnL>
-                    <a:lnR w="12700" cap="flat" cmpd="sng" algn="ctr">
-                      <a:solidFill>
-                        <a:schemeClr val="tx1"/>
-                      </a:solidFill>
-                      <a:prstDash val="solid"/>
-                      <a:round/>
-                      <a:headEnd type="none" w="med" len="med"/>
-                      <a:tailEnd type="none" w="med" len="med"/>
-                    </a:lnR>
-                    <a:lnT w="12700" cap="flat" cmpd="sng" algn="ctr">
-                      <a:solidFill>
-                        <a:schemeClr val="tx1"/>
-                      </a:solidFill>
-                      <a:prstDash val="solid"/>
-                      <a:round/>
-                      <a:headEnd type="none" w="med" len="med"/>
-                      <a:tailEnd type="none" w="med" len="med"/>
-                    </a:lnT>
-                    <a:lnB w="12700" cap="flat" cmpd="sng" algn="ctr">
-                      <a:solidFill>
-                        <a:schemeClr val="tx1"/>
-                      </a:solidFill>
-                      <a:prstDash val="solid"/>
-                      <a:round/>
-                      <a:headEnd type="none" w="med" len="med"/>
-                      <a:tailEnd type="none" w="med" len="med"/>
-                    </a:lnB>
-                    <a:noFill/>
-                  </a:tcPr>
-                </a:tc>
-                <a:tc>
-                  <a:txBody>
-                    <a:bodyPr/>
-                    <a:lstStyle/>
-                    <a:p>
-                      <a:pPr algn="ctr"/>
-                      <a:r>
-                        <a:rPr lang="en-US" sz="1800" dirty="0">
-                          <a:solidFill>
-                            <a:schemeClr val="tx1"/>
-                          </a:solidFill>
-                          <a:latin typeface="Times New Roman" panose="02020603050405020304" pitchFamily="18" charset="0"/>
-                          <a:cs typeface="Times New Roman" panose="02020603050405020304" pitchFamily="18" charset="0"/>
-                        </a:rPr>
-                        <a:t>Yes</a:t>
-                      </a:r>
-                    </a:p>
-                  </a:txBody>
-                  <a:tcPr anchor="ctr">
-                    <a:lnL w="12700" cap="flat" cmpd="sng" algn="ctr">
-                      <a:solidFill>
-                        <a:schemeClr val="tx1"/>
-                      </a:solidFill>
-                      <a:prstDash val="solid"/>
-                      <a:round/>
-                      <a:headEnd type="none" w="med" len="med"/>
-                      <a:tailEnd type="none" w="med" len="med"/>
-                    </a:lnL>
-                    <a:lnR w="12700" cap="flat" cmpd="sng" algn="ctr">
-                      <a:solidFill>
-                        <a:schemeClr val="tx1"/>
-                      </a:solidFill>
-                      <a:prstDash val="solid"/>
-                      <a:round/>
-                      <a:headEnd type="none" w="med" len="med"/>
-                      <a:tailEnd type="none" w="med" len="med"/>
-                    </a:lnR>
-                    <a:lnT w="12700" cap="flat" cmpd="sng" algn="ctr">
-                      <a:solidFill>
-                        <a:schemeClr val="tx1"/>
-                      </a:solidFill>
-                      <a:prstDash val="solid"/>
-                      <a:round/>
-                      <a:headEnd type="none" w="med" len="med"/>
-                      <a:tailEnd type="none" w="med" len="med"/>
-                    </a:lnT>
-                    <a:lnB w="12700" cap="flat" cmpd="sng" algn="ctr">
-                      <a:solidFill>
-                        <a:schemeClr val="tx1"/>
-                      </a:solidFill>
-                      <a:prstDash val="solid"/>
-                      <a:round/>
-                      <a:headEnd type="none" w="med" len="med"/>
-                      <a:tailEnd type="none" w="med" len="med"/>
-                    </a:lnB>
-                    <a:noFill/>
-                  </a:tcPr>
-                </a:tc>
-                <a:tc>
-                  <a:txBody>
-                    <a:bodyPr/>
-                    <a:lstStyle/>
-                    <a:p>
-                      <a:pPr algn="ctr"/>
-                      <a:r>
-                        <a:rPr lang="en-US" sz="1800" dirty="0">
-                          <a:solidFill>
-                            <a:schemeClr val="tx1"/>
-                          </a:solidFill>
-                          <a:latin typeface="Times New Roman" panose="02020603050405020304" pitchFamily="18" charset="0"/>
-                          <a:cs typeface="Times New Roman" panose="02020603050405020304" pitchFamily="18" charset="0"/>
-                        </a:rPr>
-                        <a:t>Yes</a:t>
-                      </a:r>
+                      <a:endParaRPr lang="en-US" sz="1800" dirty="0">
+                        <a:solidFill>
+                          <a:schemeClr val="tx1"/>
+                        </a:solidFill>
+                        <a:latin typeface="Times New Roman" panose="02020603050405020304" pitchFamily="18" charset="0"/>
+                        <a:cs typeface="Times New Roman" panose="02020603050405020304" pitchFamily="18" charset="0"/>
+                      </a:endParaRPr>
                     </a:p>
                   </a:txBody>
                   <a:tcPr anchor="ctr">
@@ -5939,6 +5475,16 @@
                     <a:p>
                       <a:pPr algn="ctr"/>
                       <a:r>
+                        <a:rPr lang="en-US" sz="1800" b="1" dirty="0" smtClean="0">
+                          <a:solidFill>
+                            <a:schemeClr val="tx1"/>
+                          </a:solidFill>
+                          <a:latin typeface="Times New Roman" panose="02020603050405020304" pitchFamily="18" charset="0"/>
+                          <a:cs typeface="Times New Roman" panose="02020603050405020304" pitchFamily="18" charset="0"/>
+                        </a:rPr>
+                        <a:t>Persist-All </a:t>
+                      </a:r>
+                      <a:r>
                         <a:rPr lang="en-US" sz="1800" b="1" dirty="0">
                           <a:solidFill>
                             <a:schemeClr val="tx1"/>
@@ -5946,7 +5492,7 @@
                           <a:latin typeface="Times New Roman" panose="02020603050405020304" pitchFamily="18" charset="0"/>
                           <a:cs typeface="Times New Roman" panose="02020603050405020304" pitchFamily="18" charset="0"/>
                         </a:rPr>
-                        <a:t>Persist-All-SD (5)</a:t>
+                        <a:t>(5)</a:t>
                       </a:r>
                     </a:p>
                   </a:txBody>
@@ -6055,131 +5601,22 @@
                     <a:p>
                       <a:pPr algn="ctr"/>
                       <a:r>
-                        <a:rPr lang="en-US" sz="1800" dirty="0">
+                        <a:rPr lang="en-US" sz="1800" dirty="0" smtClean="0">
                           <a:solidFill>
                             <a:schemeClr val="tx1"/>
                           </a:solidFill>
                           <a:latin typeface="Times New Roman" panose="02020603050405020304" pitchFamily="18" charset="0"/>
                           <a:cs typeface="Times New Roman" panose="02020603050405020304" pitchFamily="18" charset="0"/>
                         </a:rPr>
-                        <a:t>All*</a:t>
+                        <a:t>All</a:t>
                       </a:r>
-                    </a:p>
-                  </a:txBody>
-                  <a:tcPr anchor="ctr">
-                    <a:lnL w="12700" cap="flat" cmpd="sng" algn="ctr">
-                      <a:solidFill>
-                        <a:schemeClr val="tx1"/>
-                      </a:solidFill>
-                      <a:prstDash val="solid"/>
-                      <a:round/>
-                      <a:headEnd type="none" w="med" len="med"/>
-                      <a:tailEnd type="none" w="med" len="med"/>
-                    </a:lnL>
-                    <a:lnR w="12700" cap="flat" cmpd="sng" algn="ctr">
-                      <a:solidFill>
-                        <a:schemeClr val="tx1"/>
-                      </a:solidFill>
-                      <a:prstDash val="solid"/>
-                      <a:round/>
-                      <a:headEnd type="none" w="med" len="med"/>
-                      <a:tailEnd type="none" w="med" len="med"/>
-                    </a:lnR>
-                    <a:lnT w="12700" cap="flat" cmpd="sng" algn="ctr">
-                      <a:solidFill>
-                        <a:schemeClr val="tx1"/>
-                      </a:solidFill>
-                      <a:prstDash val="solid"/>
-                      <a:round/>
-                      <a:headEnd type="none" w="med" len="med"/>
-                      <a:tailEnd type="none" w="med" len="med"/>
-                    </a:lnT>
-                    <a:lnB w="12700" cap="flat" cmpd="sng" algn="ctr">
-                      <a:solidFill>
-                        <a:schemeClr val="tx1"/>
-                      </a:solidFill>
-                      <a:prstDash val="solid"/>
-                      <a:round/>
-                      <a:headEnd type="none" w="med" len="med"/>
-                      <a:tailEnd type="none" w="med" len="med"/>
-                    </a:lnB>
-                    <a:noFill/>
-                  </a:tcPr>
-                </a:tc>
-                <a:tc>
-                  <a:txBody>
-                    <a:bodyPr/>
-                    <a:lstStyle/>
-                    <a:p>
-                      <a:pPr algn="ctr"/>
-                      <a:r>
-                        <a:rPr lang="en-US" sz="1800" dirty="0">
-                          <a:solidFill>
-                            <a:schemeClr val="tx1"/>
-                          </a:solidFill>
-                          <a:latin typeface="Times New Roman" panose="02020603050405020304" pitchFamily="18" charset="0"/>
-                          <a:cs typeface="Times New Roman" panose="02020603050405020304" pitchFamily="18" charset="0"/>
-                        </a:rPr>
-                        <a:t>Yes</a:t>
-                      </a:r>
-                    </a:p>
-                  </a:txBody>
-                  <a:tcPr anchor="ctr">
-                    <a:lnL w="12700" cap="flat" cmpd="sng" algn="ctr">
-                      <a:solidFill>
-                        <a:schemeClr val="tx1"/>
-                      </a:solidFill>
-                      <a:prstDash val="solid"/>
-                      <a:round/>
-                      <a:headEnd type="none" w="med" len="med"/>
-                      <a:tailEnd type="none" w="med" len="med"/>
-                    </a:lnL>
-                    <a:lnR w="12700" cap="flat" cmpd="sng" algn="ctr">
-                      <a:solidFill>
-                        <a:schemeClr val="tx1"/>
-                      </a:solidFill>
-                      <a:prstDash val="solid"/>
-                      <a:round/>
-                      <a:headEnd type="none" w="med" len="med"/>
-                      <a:tailEnd type="none" w="med" len="med"/>
-                    </a:lnR>
-                    <a:lnT w="12700" cap="flat" cmpd="sng" algn="ctr">
-                      <a:solidFill>
-                        <a:schemeClr val="tx1"/>
-                      </a:solidFill>
-                      <a:prstDash val="solid"/>
-                      <a:round/>
-                      <a:headEnd type="none" w="med" len="med"/>
-                      <a:tailEnd type="none" w="med" len="med"/>
-                    </a:lnT>
-                    <a:lnB w="12700" cap="flat" cmpd="sng" algn="ctr">
-                      <a:solidFill>
-                        <a:schemeClr val="tx1"/>
-                      </a:solidFill>
-                      <a:prstDash val="solid"/>
-                      <a:round/>
-                      <a:headEnd type="none" w="med" len="med"/>
-                      <a:tailEnd type="none" w="med" len="med"/>
-                    </a:lnB>
-                    <a:noFill/>
-                  </a:tcPr>
-                </a:tc>
-                <a:tc>
-                  <a:txBody>
-                    <a:bodyPr/>
-                    <a:lstStyle/>
-                    <a:p>
-                      <a:pPr algn="ctr"/>
-                      <a:r>
-                        <a:rPr lang="en-US" sz="1800" dirty="0">
-                          <a:solidFill>
-                            <a:schemeClr val="tx1"/>
-                          </a:solidFill>
-                          <a:latin typeface="Times New Roman" panose="02020603050405020304" pitchFamily="18" charset="0"/>
-                          <a:cs typeface="Times New Roman" panose="02020603050405020304" pitchFamily="18" charset="0"/>
-                        </a:rPr>
-                        <a:t>Yes</a:t>
-                      </a:r>
+                      <a:endParaRPr lang="en-US" sz="1800" dirty="0">
+                        <a:solidFill>
+                          <a:schemeClr val="tx1"/>
+                        </a:solidFill>
+                        <a:latin typeface="Times New Roman" panose="02020603050405020304" pitchFamily="18" charset="0"/>
+                        <a:cs typeface="Times New Roman" panose="02020603050405020304" pitchFamily="18" charset="0"/>
+                      </a:endParaRPr>
                     </a:p>
                   </a:txBody>
                   <a:tcPr anchor="ctr">
@@ -6236,15 +5673,22 @@
                     <a:p>
                       <a:pPr algn="ctr"/>
                       <a:r>
-                        <a:rPr lang="en-US" sz="1800" b="1" dirty="0">
+                        <a:rPr lang="en-US" sz="1800" b="1" dirty="0" smtClean="0">
                           <a:solidFill>
                             <a:schemeClr val="tx1"/>
                           </a:solidFill>
                           <a:latin typeface="Times New Roman" panose="02020603050405020304" pitchFamily="18" charset="0"/>
                           <a:cs typeface="Times New Roman" panose="02020603050405020304" pitchFamily="18" charset="0"/>
                         </a:rPr>
-                        <a:t>Disease-All-S (6)</a:t>
+                        <a:t>Disease-Index (6)</a:t>
                       </a:r>
+                      <a:endParaRPr lang="en-US" sz="1800" b="1" dirty="0">
+                        <a:solidFill>
+                          <a:schemeClr val="tx1"/>
+                        </a:solidFill>
+                        <a:latin typeface="Times New Roman" panose="02020603050405020304" pitchFamily="18" charset="0"/>
+                        <a:cs typeface="Times New Roman" panose="02020603050405020304" pitchFamily="18" charset="0"/>
+                      </a:endParaRPr>
                     </a:p>
                   </a:txBody>
                   <a:tcPr anchor="ctr">
@@ -6294,7 +5738,7 @@
                     <a:p>
                       <a:pPr algn="ctr"/>
                       <a:r>
-                        <a:rPr lang="en-US" sz="1800" dirty="0">
+                        <a:rPr lang="en-US" sz="1800" dirty="0" smtClean="0">
                           <a:solidFill>
                             <a:schemeClr val="tx1"/>
                           </a:solidFill>
@@ -6303,6 +5747,13 @@
                         </a:rPr>
                         <a:t>NTM disease</a:t>
                       </a:r>
+                      <a:endParaRPr lang="en-US" sz="1800" dirty="0">
+                        <a:solidFill>
+                          <a:schemeClr val="tx1"/>
+                        </a:solidFill>
+                        <a:latin typeface="Times New Roman" panose="02020603050405020304" pitchFamily="18" charset="0"/>
+                        <a:cs typeface="Times New Roman" panose="02020603050405020304" pitchFamily="18" charset="0"/>
+                      </a:endParaRPr>
                     </a:p>
                   </a:txBody>
                   <a:tcPr anchor="ctr">
@@ -6352,1319 +5803,22 @@
                     <a:p>
                       <a:pPr algn="ctr"/>
                       <a:r>
-                        <a:rPr lang="en-US" sz="1800" dirty="0">
+                        <a:rPr lang="en-US" sz="1800" dirty="0" smtClean="0">
                           <a:solidFill>
                             <a:schemeClr val="tx1"/>
                           </a:solidFill>
                           <a:latin typeface="Times New Roman" panose="02020603050405020304" pitchFamily="18" charset="0"/>
                           <a:cs typeface="Times New Roman" panose="02020603050405020304" pitchFamily="18" charset="0"/>
                         </a:rPr>
-                        <a:t>All</a:t>
+                        <a:t>Index and prior sample only</a:t>
                       </a:r>
-                    </a:p>
-                  </a:txBody>
-                  <a:tcPr anchor="ctr">
-                    <a:lnL w="12700" cap="flat" cmpd="sng" algn="ctr">
-                      <a:solidFill>
-                        <a:schemeClr val="tx1"/>
-                      </a:solidFill>
-                      <a:prstDash val="solid"/>
-                      <a:round/>
-                      <a:headEnd type="none" w="med" len="med"/>
-                      <a:tailEnd type="none" w="med" len="med"/>
-                    </a:lnL>
-                    <a:lnR w="12700" cap="flat" cmpd="sng" algn="ctr">
-                      <a:solidFill>
-                        <a:schemeClr val="tx1"/>
-                      </a:solidFill>
-                      <a:prstDash val="solid"/>
-                      <a:round/>
-                      <a:headEnd type="none" w="med" len="med"/>
-                      <a:tailEnd type="none" w="med" len="med"/>
-                    </a:lnR>
-                    <a:lnT w="12700" cap="flat" cmpd="sng" algn="ctr">
-                      <a:solidFill>
-                        <a:schemeClr val="tx1"/>
-                      </a:solidFill>
-                      <a:prstDash val="solid"/>
-                      <a:round/>
-                      <a:headEnd type="none" w="med" len="med"/>
-                      <a:tailEnd type="none" w="med" len="med"/>
-                    </a:lnT>
-                    <a:lnB w="12700" cap="flat" cmpd="sng" algn="ctr">
-                      <a:solidFill>
-                        <a:schemeClr val="tx1"/>
-                      </a:solidFill>
-                      <a:prstDash val="solid"/>
-                      <a:round/>
-                      <a:headEnd type="none" w="med" len="med"/>
-                      <a:tailEnd type="none" w="med" len="med"/>
-                    </a:lnB>
-                    <a:noFill/>
-                  </a:tcPr>
-                </a:tc>
-                <a:tc>
-                  <a:txBody>
-                    <a:bodyPr/>
-                    <a:lstStyle/>
-                    <a:p>
-                      <a:pPr algn="ctr"/>
-                      <a:r>
-                        <a:rPr lang="en-US" sz="1800" dirty="0">
-                          <a:solidFill>
-                            <a:schemeClr val="tx1"/>
-                          </a:solidFill>
-                          <a:latin typeface="Times New Roman" panose="02020603050405020304" pitchFamily="18" charset="0"/>
-                          <a:cs typeface="Times New Roman" panose="02020603050405020304" pitchFamily="18" charset="0"/>
-                        </a:rPr>
-                        <a:t>Yes</a:t>
-                      </a:r>
-                    </a:p>
-                  </a:txBody>
-                  <a:tcPr anchor="ctr">
-                    <a:lnL w="12700" cap="flat" cmpd="sng" algn="ctr">
-                      <a:solidFill>
-                        <a:schemeClr val="tx1"/>
-                      </a:solidFill>
-                      <a:prstDash val="solid"/>
-                      <a:round/>
-                      <a:headEnd type="none" w="med" len="med"/>
-                      <a:tailEnd type="none" w="med" len="med"/>
-                    </a:lnL>
-                    <a:lnR w="12700" cap="flat" cmpd="sng" algn="ctr">
-                      <a:solidFill>
-                        <a:schemeClr val="tx1"/>
-                      </a:solidFill>
-                      <a:prstDash val="solid"/>
-                      <a:round/>
-                      <a:headEnd type="none" w="med" len="med"/>
-                      <a:tailEnd type="none" w="med" len="med"/>
-                    </a:lnR>
-                    <a:lnT w="12700" cap="flat" cmpd="sng" algn="ctr">
-                      <a:solidFill>
-                        <a:schemeClr val="tx1"/>
-                      </a:solidFill>
-                      <a:prstDash val="solid"/>
-                      <a:round/>
-                      <a:headEnd type="none" w="med" len="med"/>
-                      <a:tailEnd type="none" w="med" len="med"/>
-                    </a:lnT>
-                    <a:lnB w="12700" cap="flat" cmpd="sng" algn="ctr">
-                      <a:solidFill>
-                        <a:schemeClr val="tx1"/>
-                      </a:solidFill>
-                      <a:prstDash val="solid"/>
-                      <a:round/>
-                      <a:headEnd type="none" w="med" len="med"/>
-                      <a:tailEnd type="none" w="med" len="med"/>
-                    </a:lnB>
-                    <a:noFill/>
-                  </a:tcPr>
-                </a:tc>
-                <a:tc>
-                  <a:txBody>
-                    <a:bodyPr/>
-                    <a:lstStyle/>
-                    <a:p>
-                      <a:pPr algn="ctr"/>
-                      <a:r>
-                        <a:rPr lang="en-US" sz="1800" dirty="0">
-                          <a:solidFill>
-                            <a:schemeClr val="tx1"/>
-                          </a:solidFill>
-                          <a:latin typeface="Times New Roman" panose="02020603050405020304" pitchFamily="18" charset="0"/>
-                          <a:cs typeface="Times New Roman" panose="02020603050405020304" pitchFamily="18" charset="0"/>
-                        </a:rPr>
-                        <a:t>No</a:t>
-                      </a:r>
-                    </a:p>
-                  </a:txBody>
-                  <a:tcPr anchor="ctr">
-                    <a:lnL w="12700" cap="flat" cmpd="sng" algn="ctr">
-                      <a:solidFill>
-                        <a:schemeClr val="tx1"/>
-                      </a:solidFill>
-                      <a:prstDash val="solid"/>
-                      <a:round/>
-                      <a:headEnd type="none" w="med" len="med"/>
-                      <a:tailEnd type="none" w="med" len="med"/>
-                    </a:lnL>
-                    <a:lnR w="12700" cap="flat" cmpd="sng" algn="ctr">
-                      <a:solidFill>
-                        <a:schemeClr val="tx1"/>
-                      </a:solidFill>
-                      <a:prstDash val="solid"/>
-                      <a:round/>
-                      <a:headEnd type="none" w="med" len="med"/>
-                      <a:tailEnd type="none" w="med" len="med"/>
-                    </a:lnR>
-                    <a:lnT w="12700" cap="flat" cmpd="sng" algn="ctr">
-                      <a:solidFill>
-                        <a:schemeClr val="tx1"/>
-                      </a:solidFill>
-                      <a:prstDash val="solid"/>
-                      <a:round/>
-                      <a:headEnd type="none" w="med" len="med"/>
-                      <a:tailEnd type="none" w="med" len="med"/>
-                    </a:lnT>
-                    <a:lnB w="12700" cap="flat" cmpd="sng" algn="ctr">
-                      <a:solidFill>
-                        <a:schemeClr val="tx1"/>
-                      </a:solidFill>
-                      <a:prstDash val="solid"/>
-                      <a:round/>
-                      <a:headEnd type="none" w="med" len="med"/>
-                      <a:tailEnd type="none" w="med" len="med"/>
-                    </a:lnB>
-                    <a:noFill/>
-                  </a:tcPr>
-                </a:tc>
-                <a:extLst>
-                  <a:ext uri="{0D108BD9-81ED-4DB2-BD59-A6C34878D82A}">
-                    <a16:rowId xmlns:a16="http://schemas.microsoft.com/office/drawing/2014/main" val="2082964542"/>
-                  </a:ext>
-                </a:extLst>
-              </a:tr>
-              <a:tr h="370840">
-                <a:tc>
-                  <a:txBody>
-                    <a:bodyPr/>
-                    <a:lstStyle/>
-                    <a:p>
-                      <a:pPr algn="ctr"/>
-                      <a:r>
-                        <a:rPr lang="en-US" sz="1800" b="1" dirty="0">
-                          <a:solidFill>
-                            <a:schemeClr val="tx1"/>
-                          </a:solidFill>
-                          <a:latin typeface="Times New Roman" panose="02020603050405020304" pitchFamily="18" charset="0"/>
-                          <a:cs typeface="Times New Roman" panose="02020603050405020304" pitchFamily="18" charset="0"/>
-                        </a:rPr>
-                        <a:t>Disease-All-D (7)</a:t>
-                      </a:r>
-                    </a:p>
-                  </a:txBody>
-                  <a:tcPr anchor="ctr">
-                    <a:lnL w="12700" cap="flat" cmpd="sng" algn="ctr">
-                      <a:solidFill>
-                        <a:schemeClr val="tx1"/>
-                      </a:solidFill>
-                      <a:prstDash val="solid"/>
-                      <a:round/>
-                      <a:headEnd type="none" w="med" len="med"/>
-                      <a:tailEnd type="none" w="med" len="med"/>
-                    </a:lnL>
-                    <a:lnR w="12700" cap="flat" cmpd="sng" algn="ctr">
-                      <a:solidFill>
-                        <a:schemeClr val="tx1"/>
-                      </a:solidFill>
-                      <a:prstDash val="solid"/>
-                      <a:round/>
-                      <a:headEnd type="none" w="med" len="med"/>
-                      <a:tailEnd type="none" w="med" len="med"/>
-                    </a:lnR>
-                    <a:lnT w="12700" cap="flat" cmpd="sng" algn="ctr">
-                      <a:solidFill>
-                        <a:schemeClr val="tx1"/>
-                      </a:solidFill>
-                      <a:prstDash val="solid"/>
-                      <a:round/>
-                      <a:headEnd type="none" w="med" len="med"/>
-                      <a:tailEnd type="none" w="med" len="med"/>
-                    </a:lnT>
-                    <a:lnB w="12700" cap="flat" cmpd="sng" algn="ctr">
-                      <a:solidFill>
-                        <a:schemeClr val="tx1"/>
-                      </a:solidFill>
-                      <a:prstDash val="solid"/>
-                      <a:round/>
-                      <a:headEnd type="none" w="med" len="med"/>
-                      <a:tailEnd type="none" w="med" len="med"/>
-                    </a:lnB>
-                    <a:noFill/>
-                  </a:tcPr>
-                </a:tc>
-                <a:tc>
-                  <a:txBody>
-                    <a:bodyPr/>
-                    <a:lstStyle/>
-                    <a:p>
-                      <a:pPr algn="ctr"/>
-                      <a:r>
-                        <a:rPr lang="en-US" sz="1800" dirty="0">
-                          <a:solidFill>
-                            <a:schemeClr val="tx1"/>
-                          </a:solidFill>
-                          <a:latin typeface="Times New Roman" panose="02020603050405020304" pitchFamily="18" charset="0"/>
-                          <a:cs typeface="Times New Roman" panose="02020603050405020304" pitchFamily="18" charset="0"/>
-                        </a:rPr>
-                        <a:t>NTM disease</a:t>
-                      </a:r>
-                    </a:p>
-                  </a:txBody>
-                  <a:tcPr anchor="ctr">
-                    <a:lnL w="12700" cap="flat" cmpd="sng" algn="ctr">
-                      <a:solidFill>
-                        <a:schemeClr val="tx1"/>
-                      </a:solidFill>
-                      <a:prstDash val="solid"/>
-                      <a:round/>
-                      <a:headEnd type="none" w="med" len="med"/>
-                      <a:tailEnd type="none" w="med" len="med"/>
-                    </a:lnL>
-                    <a:lnR w="12700" cap="flat" cmpd="sng" algn="ctr">
-                      <a:solidFill>
-                        <a:schemeClr val="tx1"/>
-                      </a:solidFill>
-                      <a:prstDash val="solid"/>
-                      <a:round/>
-                      <a:headEnd type="none" w="med" len="med"/>
-                      <a:tailEnd type="none" w="med" len="med"/>
-                    </a:lnR>
-                    <a:lnT w="12700" cap="flat" cmpd="sng" algn="ctr">
-                      <a:solidFill>
-                        <a:schemeClr val="tx1"/>
-                      </a:solidFill>
-                      <a:prstDash val="solid"/>
-                      <a:round/>
-                      <a:headEnd type="none" w="med" len="med"/>
-                      <a:tailEnd type="none" w="med" len="med"/>
-                    </a:lnT>
-                    <a:lnB w="12700" cap="flat" cmpd="sng" algn="ctr">
-                      <a:solidFill>
-                        <a:schemeClr val="tx1"/>
-                      </a:solidFill>
-                      <a:prstDash val="solid"/>
-                      <a:round/>
-                      <a:headEnd type="none" w="med" len="med"/>
-                      <a:tailEnd type="none" w="med" len="med"/>
-                    </a:lnB>
-                    <a:noFill/>
-                  </a:tcPr>
-                </a:tc>
-                <a:tc>
-                  <a:txBody>
-                    <a:bodyPr/>
-                    <a:lstStyle/>
-                    <a:p>
-                      <a:pPr algn="ctr"/>
-                      <a:r>
-                        <a:rPr lang="en-US" sz="1800" dirty="0">
-                          <a:solidFill>
-                            <a:schemeClr val="tx1"/>
-                          </a:solidFill>
-                          <a:latin typeface="Times New Roman" panose="02020603050405020304" pitchFamily="18" charset="0"/>
-                          <a:cs typeface="Times New Roman" panose="02020603050405020304" pitchFamily="18" charset="0"/>
-                        </a:rPr>
-                        <a:t>All*</a:t>
-                      </a:r>
-                    </a:p>
-                  </a:txBody>
-                  <a:tcPr anchor="ctr">
-                    <a:lnL w="12700" cap="flat" cmpd="sng" algn="ctr">
-                      <a:solidFill>
-                        <a:schemeClr val="tx1"/>
-                      </a:solidFill>
-                      <a:prstDash val="solid"/>
-                      <a:round/>
-                      <a:headEnd type="none" w="med" len="med"/>
-                      <a:tailEnd type="none" w="med" len="med"/>
-                    </a:lnL>
-                    <a:lnR w="12700" cap="flat" cmpd="sng" algn="ctr">
-                      <a:solidFill>
-                        <a:schemeClr val="tx1"/>
-                      </a:solidFill>
-                      <a:prstDash val="solid"/>
-                      <a:round/>
-                      <a:headEnd type="none" w="med" len="med"/>
-                      <a:tailEnd type="none" w="med" len="med"/>
-                    </a:lnR>
-                    <a:lnT w="12700" cap="flat" cmpd="sng" algn="ctr">
-                      <a:solidFill>
-                        <a:schemeClr val="tx1"/>
-                      </a:solidFill>
-                      <a:prstDash val="solid"/>
-                      <a:round/>
-                      <a:headEnd type="none" w="med" len="med"/>
-                      <a:tailEnd type="none" w="med" len="med"/>
-                    </a:lnT>
-                    <a:lnB w="12700" cap="flat" cmpd="sng" algn="ctr">
-                      <a:solidFill>
-                        <a:schemeClr val="tx1"/>
-                      </a:solidFill>
-                      <a:prstDash val="solid"/>
-                      <a:round/>
-                      <a:headEnd type="none" w="med" len="med"/>
-                      <a:tailEnd type="none" w="med" len="med"/>
-                    </a:lnB>
-                    <a:noFill/>
-                  </a:tcPr>
-                </a:tc>
-                <a:tc>
-                  <a:txBody>
-                    <a:bodyPr/>
-                    <a:lstStyle/>
-                    <a:p>
-                      <a:pPr algn="ctr"/>
-                      <a:r>
-                        <a:rPr lang="en-US" sz="1800" dirty="0">
-                          <a:solidFill>
-                            <a:schemeClr val="tx1"/>
-                          </a:solidFill>
-                          <a:latin typeface="Times New Roman" panose="02020603050405020304" pitchFamily="18" charset="0"/>
-                          <a:cs typeface="Times New Roman" panose="02020603050405020304" pitchFamily="18" charset="0"/>
-                        </a:rPr>
-                        <a:t>No</a:t>
-                      </a:r>
-                    </a:p>
-                  </a:txBody>
-                  <a:tcPr anchor="ctr">
-                    <a:lnL w="12700" cap="flat" cmpd="sng" algn="ctr">
-                      <a:solidFill>
-                        <a:schemeClr val="tx1"/>
-                      </a:solidFill>
-                      <a:prstDash val="solid"/>
-                      <a:round/>
-                      <a:headEnd type="none" w="med" len="med"/>
-                      <a:tailEnd type="none" w="med" len="med"/>
-                    </a:lnL>
-                    <a:lnR w="12700" cap="flat" cmpd="sng" algn="ctr">
-                      <a:solidFill>
-                        <a:schemeClr val="tx1"/>
-                      </a:solidFill>
-                      <a:prstDash val="solid"/>
-                      <a:round/>
-                      <a:headEnd type="none" w="med" len="med"/>
-                      <a:tailEnd type="none" w="med" len="med"/>
-                    </a:lnR>
-                    <a:lnT w="12700" cap="flat" cmpd="sng" algn="ctr">
-                      <a:solidFill>
-                        <a:schemeClr val="tx1"/>
-                      </a:solidFill>
-                      <a:prstDash val="solid"/>
-                      <a:round/>
-                      <a:headEnd type="none" w="med" len="med"/>
-                      <a:tailEnd type="none" w="med" len="med"/>
-                    </a:lnT>
-                    <a:lnB w="12700" cap="flat" cmpd="sng" algn="ctr">
-                      <a:solidFill>
-                        <a:schemeClr val="tx1"/>
-                      </a:solidFill>
-                      <a:prstDash val="solid"/>
-                      <a:round/>
-                      <a:headEnd type="none" w="med" len="med"/>
-                      <a:tailEnd type="none" w="med" len="med"/>
-                    </a:lnB>
-                    <a:noFill/>
-                  </a:tcPr>
-                </a:tc>
-                <a:tc>
-                  <a:txBody>
-                    <a:bodyPr/>
-                    <a:lstStyle/>
-                    <a:p>
-                      <a:pPr algn="ctr"/>
-                      <a:r>
-                        <a:rPr lang="en-US" sz="1800" dirty="0">
-                          <a:solidFill>
-                            <a:schemeClr val="tx1"/>
-                          </a:solidFill>
-                          <a:latin typeface="Times New Roman" panose="02020603050405020304" pitchFamily="18" charset="0"/>
-                          <a:cs typeface="Times New Roman" panose="02020603050405020304" pitchFamily="18" charset="0"/>
-                        </a:rPr>
-                        <a:t>Yes</a:t>
-                      </a:r>
-                    </a:p>
-                  </a:txBody>
-                  <a:tcPr anchor="ctr">
-                    <a:lnL w="12700" cap="flat" cmpd="sng" algn="ctr">
-                      <a:solidFill>
-                        <a:schemeClr val="tx1"/>
-                      </a:solidFill>
-                      <a:prstDash val="solid"/>
-                      <a:round/>
-                      <a:headEnd type="none" w="med" len="med"/>
-                      <a:tailEnd type="none" w="med" len="med"/>
-                    </a:lnL>
-                    <a:lnR w="12700" cap="flat" cmpd="sng" algn="ctr">
-                      <a:solidFill>
-                        <a:schemeClr val="tx1"/>
-                      </a:solidFill>
-                      <a:prstDash val="solid"/>
-                      <a:round/>
-                      <a:headEnd type="none" w="med" len="med"/>
-                      <a:tailEnd type="none" w="med" len="med"/>
-                    </a:lnR>
-                    <a:lnT w="12700" cap="flat" cmpd="sng" algn="ctr">
-                      <a:solidFill>
-                        <a:schemeClr val="tx1"/>
-                      </a:solidFill>
-                      <a:prstDash val="solid"/>
-                      <a:round/>
-                      <a:headEnd type="none" w="med" len="med"/>
-                      <a:tailEnd type="none" w="med" len="med"/>
-                    </a:lnT>
-                    <a:lnB w="12700" cap="flat" cmpd="sng" algn="ctr">
-                      <a:solidFill>
-                        <a:schemeClr val="tx1"/>
-                      </a:solidFill>
-                      <a:prstDash val="solid"/>
-                      <a:round/>
-                      <a:headEnd type="none" w="med" len="med"/>
-                      <a:tailEnd type="none" w="med" len="med"/>
-                    </a:lnB>
-                    <a:noFill/>
-                  </a:tcPr>
-                </a:tc>
-                <a:extLst>
-                  <a:ext uri="{0D108BD9-81ED-4DB2-BD59-A6C34878D82A}">
-                    <a16:rowId xmlns:a16="http://schemas.microsoft.com/office/drawing/2014/main" val="771903738"/>
-                  </a:ext>
-                </a:extLst>
-              </a:tr>
-              <a:tr h="424890">
-                <a:tc>
-                  <a:txBody>
-                    <a:bodyPr/>
-                    <a:lstStyle/>
-                    <a:p>
-                      <a:pPr algn="ctr"/>
-                      <a:r>
-                        <a:rPr lang="en-US" sz="1800" b="1" dirty="0">
-                          <a:solidFill>
-                            <a:schemeClr val="tx1"/>
-                          </a:solidFill>
-                          <a:latin typeface="Times New Roman" panose="02020603050405020304" pitchFamily="18" charset="0"/>
-                          <a:cs typeface="Times New Roman" panose="02020603050405020304" pitchFamily="18" charset="0"/>
-                        </a:rPr>
-                        <a:t>Infect-All-S (8)</a:t>
-                      </a:r>
-                    </a:p>
-                  </a:txBody>
-                  <a:tcPr anchor="ctr">
-                    <a:lnL w="12700" cap="flat" cmpd="sng" algn="ctr">
-                      <a:solidFill>
-                        <a:schemeClr val="tx1"/>
-                      </a:solidFill>
-                      <a:prstDash val="solid"/>
-                      <a:round/>
-                      <a:headEnd type="none" w="med" len="med"/>
-                      <a:tailEnd type="none" w="med" len="med"/>
-                    </a:lnL>
-                    <a:lnR w="12700" cap="flat" cmpd="sng" algn="ctr">
-                      <a:solidFill>
-                        <a:schemeClr val="tx1"/>
-                      </a:solidFill>
-                      <a:prstDash val="solid"/>
-                      <a:round/>
-                      <a:headEnd type="none" w="med" len="med"/>
-                      <a:tailEnd type="none" w="med" len="med"/>
-                    </a:lnR>
-                    <a:lnT w="12700" cap="flat" cmpd="sng" algn="ctr">
-                      <a:solidFill>
-                        <a:schemeClr val="tx1"/>
-                      </a:solidFill>
-                      <a:prstDash val="solid"/>
-                      <a:round/>
-                      <a:headEnd type="none" w="med" len="med"/>
-                      <a:tailEnd type="none" w="med" len="med"/>
-                    </a:lnT>
-                    <a:lnB w="12700" cap="flat" cmpd="sng" algn="ctr">
-                      <a:solidFill>
-                        <a:schemeClr val="tx1"/>
-                      </a:solidFill>
-                      <a:prstDash val="solid"/>
-                      <a:round/>
-                      <a:headEnd type="none" w="med" len="med"/>
-                      <a:tailEnd type="none" w="med" len="med"/>
-                    </a:lnB>
-                    <a:noFill/>
-                  </a:tcPr>
-                </a:tc>
-                <a:tc>
-                  <a:txBody>
-                    <a:bodyPr/>
-                    <a:lstStyle/>
-                    <a:p>
-                      <a:pPr algn="ctr"/>
-                      <a:r>
-                        <a:rPr lang="en-US" sz="1800" dirty="0">
-                          <a:solidFill>
-                            <a:schemeClr val="tx1"/>
-                          </a:solidFill>
-                          <a:latin typeface="Times New Roman" panose="02020603050405020304" pitchFamily="18" charset="0"/>
-                          <a:cs typeface="Times New Roman" panose="02020603050405020304" pitchFamily="18" charset="0"/>
-                        </a:rPr>
-                        <a:t>NTM infection</a:t>
-                      </a:r>
-                    </a:p>
-                  </a:txBody>
-                  <a:tcPr anchor="ctr">
-                    <a:lnL w="12700" cap="flat" cmpd="sng" algn="ctr">
-                      <a:solidFill>
-                        <a:schemeClr val="tx1"/>
-                      </a:solidFill>
-                      <a:prstDash val="solid"/>
-                      <a:round/>
-                      <a:headEnd type="none" w="med" len="med"/>
-                      <a:tailEnd type="none" w="med" len="med"/>
-                    </a:lnL>
-                    <a:lnR w="12700" cap="flat" cmpd="sng" algn="ctr">
-                      <a:solidFill>
-                        <a:schemeClr val="tx1"/>
-                      </a:solidFill>
-                      <a:prstDash val="solid"/>
-                      <a:round/>
-                      <a:headEnd type="none" w="med" len="med"/>
-                      <a:tailEnd type="none" w="med" len="med"/>
-                    </a:lnR>
-                    <a:lnT w="12700" cap="flat" cmpd="sng" algn="ctr">
-                      <a:solidFill>
-                        <a:schemeClr val="tx1"/>
-                      </a:solidFill>
-                      <a:prstDash val="solid"/>
-                      <a:round/>
-                      <a:headEnd type="none" w="med" len="med"/>
-                      <a:tailEnd type="none" w="med" len="med"/>
-                    </a:lnT>
-                    <a:lnB w="12700" cap="flat" cmpd="sng" algn="ctr">
-                      <a:solidFill>
-                        <a:schemeClr val="tx1"/>
-                      </a:solidFill>
-                      <a:prstDash val="solid"/>
-                      <a:round/>
-                      <a:headEnd type="none" w="med" len="med"/>
-                      <a:tailEnd type="none" w="med" len="med"/>
-                    </a:lnB>
-                    <a:noFill/>
-                  </a:tcPr>
-                </a:tc>
-                <a:tc>
-                  <a:txBody>
-                    <a:bodyPr/>
-                    <a:lstStyle/>
-                    <a:p>
-                      <a:pPr algn="ctr"/>
-                      <a:r>
-                        <a:rPr lang="en-US" sz="1800" dirty="0">
-                          <a:solidFill>
-                            <a:schemeClr val="tx1"/>
-                          </a:solidFill>
-                          <a:latin typeface="Times New Roman" panose="02020603050405020304" pitchFamily="18" charset="0"/>
-                          <a:cs typeface="Times New Roman" panose="02020603050405020304" pitchFamily="18" charset="0"/>
-                        </a:rPr>
-                        <a:t>All</a:t>
-                      </a:r>
-                    </a:p>
-                  </a:txBody>
-                  <a:tcPr anchor="ctr">
-                    <a:lnL w="12700" cap="flat" cmpd="sng" algn="ctr">
-                      <a:solidFill>
-                        <a:schemeClr val="tx1"/>
-                      </a:solidFill>
-                      <a:prstDash val="solid"/>
-                      <a:round/>
-                      <a:headEnd type="none" w="med" len="med"/>
-                      <a:tailEnd type="none" w="med" len="med"/>
-                    </a:lnL>
-                    <a:lnR w="12700" cap="flat" cmpd="sng" algn="ctr">
-                      <a:solidFill>
-                        <a:schemeClr val="tx1"/>
-                      </a:solidFill>
-                      <a:prstDash val="solid"/>
-                      <a:round/>
-                      <a:headEnd type="none" w="med" len="med"/>
-                      <a:tailEnd type="none" w="med" len="med"/>
-                    </a:lnR>
-                    <a:lnT w="12700" cap="flat" cmpd="sng" algn="ctr">
-                      <a:solidFill>
-                        <a:schemeClr val="tx1"/>
-                      </a:solidFill>
-                      <a:prstDash val="solid"/>
-                      <a:round/>
-                      <a:headEnd type="none" w="med" len="med"/>
-                      <a:tailEnd type="none" w="med" len="med"/>
-                    </a:lnT>
-                    <a:lnB w="12700" cap="flat" cmpd="sng" algn="ctr">
-                      <a:solidFill>
-                        <a:schemeClr val="tx1"/>
-                      </a:solidFill>
-                      <a:prstDash val="solid"/>
-                      <a:round/>
-                      <a:headEnd type="none" w="med" len="med"/>
-                      <a:tailEnd type="none" w="med" len="med"/>
-                    </a:lnB>
-                    <a:noFill/>
-                  </a:tcPr>
-                </a:tc>
-                <a:tc>
-                  <a:txBody>
-                    <a:bodyPr/>
-                    <a:lstStyle/>
-                    <a:p>
-                      <a:pPr algn="ctr"/>
-                      <a:r>
-                        <a:rPr lang="en-US" sz="1800" dirty="0">
-                          <a:solidFill>
-                            <a:schemeClr val="tx1"/>
-                          </a:solidFill>
-                          <a:latin typeface="Times New Roman" panose="02020603050405020304" pitchFamily="18" charset="0"/>
-                          <a:cs typeface="Times New Roman" panose="02020603050405020304" pitchFamily="18" charset="0"/>
-                        </a:rPr>
-                        <a:t>Yes</a:t>
-                      </a:r>
-                    </a:p>
-                  </a:txBody>
-                  <a:tcPr anchor="ctr">
-                    <a:lnL w="12700" cap="flat" cmpd="sng" algn="ctr">
-                      <a:solidFill>
-                        <a:schemeClr val="tx1"/>
-                      </a:solidFill>
-                      <a:prstDash val="solid"/>
-                      <a:round/>
-                      <a:headEnd type="none" w="med" len="med"/>
-                      <a:tailEnd type="none" w="med" len="med"/>
-                    </a:lnL>
-                    <a:lnR w="12700" cap="flat" cmpd="sng" algn="ctr">
-                      <a:solidFill>
-                        <a:schemeClr val="tx1"/>
-                      </a:solidFill>
-                      <a:prstDash val="solid"/>
-                      <a:round/>
-                      <a:headEnd type="none" w="med" len="med"/>
-                      <a:tailEnd type="none" w="med" len="med"/>
-                    </a:lnR>
-                    <a:lnT w="12700" cap="flat" cmpd="sng" algn="ctr">
-                      <a:solidFill>
-                        <a:schemeClr val="tx1"/>
-                      </a:solidFill>
-                      <a:prstDash val="solid"/>
-                      <a:round/>
-                      <a:headEnd type="none" w="med" len="med"/>
-                      <a:tailEnd type="none" w="med" len="med"/>
-                    </a:lnT>
-                    <a:lnB w="12700" cap="flat" cmpd="sng" algn="ctr">
-                      <a:solidFill>
-                        <a:schemeClr val="tx1"/>
-                      </a:solidFill>
-                      <a:prstDash val="solid"/>
-                      <a:round/>
-                      <a:headEnd type="none" w="med" len="med"/>
-                      <a:tailEnd type="none" w="med" len="med"/>
-                    </a:lnB>
-                    <a:noFill/>
-                  </a:tcPr>
-                </a:tc>
-                <a:tc>
-                  <a:txBody>
-                    <a:bodyPr/>
-                    <a:lstStyle/>
-                    <a:p>
-                      <a:pPr algn="ctr"/>
-                      <a:r>
-                        <a:rPr lang="en-US" sz="1800" dirty="0">
-                          <a:solidFill>
-                            <a:schemeClr val="tx1"/>
-                          </a:solidFill>
-                          <a:latin typeface="Times New Roman" panose="02020603050405020304" pitchFamily="18" charset="0"/>
-                          <a:cs typeface="Times New Roman" panose="02020603050405020304" pitchFamily="18" charset="0"/>
-                        </a:rPr>
-                        <a:t>No</a:t>
-                      </a:r>
-                    </a:p>
-                  </a:txBody>
-                  <a:tcPr anchor="ctr">
-                    <a:lnL w="12700" cap="flat" cmpd="sng" algn="ctr">
-                      <a:solidFill>
-                        <a:schemeClr val="tx1"/>
-                      </a:solidFill>
-                      <a:prstDash val="solid"/>
-                      <a:round/>
-                      <a:headEnd type="none" w="med" len="med"/>
-                      <a:tailEnd type="none" w="med" len="med"/>
-                    </a:lnL>
-                    <a:lnR w="12700" cap="flat" cmpd="sng" algn="ctr">
-                      <a:solidFill>
-                        <a:schemeClr val="tx1"/>
-                      </a:solidFill>
-                      <a:prstDash val="solid"/>
-                      <a:round/>
-                      <a:headEnd type="none" w="med" len="med"/>
-                      <a:tailEnd type="none" w="med" len="med"/>
-                    </a:lnR>
-                    <a:lnT w="12700" cap="flat" cmpd="sng" algn="ctr">
-                      <a:solidFill>
-                        <a:schemeClr val="tx1"/>
-                      </a:solidFill>
-                      <a:prstDash val="solid"/>
-                      <a:round/>
-                      <a:headEnd type="none" w="med" len="med"/>
-                      <a:tailEnd type="none" w="med" len="med"/>
-                    </a:lnT>
-                    <a:lnB w="12700" cap="flat" cmpd="sng" algn="ctr">
-                      <a:solidFill>
-                        <a:schemeClr val="tx1"/>
-                      </a:solidFill>
-                      <a:prstDash val="solid"/>
-                      <a:round/>
-                      <a:headEnd type="none" w="med" len="med"/>
-                      <a:tailEnd type="none" w="med" len="med"/>
-                    </a:lnB>
-                    <a:noFill/>
-                  </a:tcPr>
-                </a:tc>
-                <a:extLst>
-                  <a:ext uri="{0D108BD9-81ED-4DB2-BD59-A6C34878D82A}">
-                    <a16:rowId xmlns:a16="http://schemas.microsoft.com/office/drawing/2014/main" val="926401642"/>
-                  </a:ext>
-                </a:extLst>
-              </a:tr>
-              <a:tr h="370840">
-                <a:tc>
-                  <a:txBody>
-                    <a:bodyPr/>
-                    <a:lstStyle/>
-                    <a:p>
-                      <a:pPr algn="ctr"/>
-                      <a:r>
-                        <a:rPr lang="en-US" sz="1800" b="1" dirty="0">
-                          <a:solidFill>
-                            <a:schemeClr val="tx1"/>
-                          </a:solidFill>
-                          <a:latin typeface="Times New Roman" panose="02020603050405020304" pitchFamily="18" charset="0"/>
-                          <a:cs typeface="Times New Roman" panose="02020603050405020304" pitchFamily="18" charset="0"/>
-                        </a:rPr>
-                        <a:t>Infect-All-D (9)</a:t>
-                      </a:r>
-                    </a:p>
-                  </a:txBody>
-                  <a:tcPr anchor="ctr">
-                    <a:lnL w="12700" cap="flat" cmpd="sng" algn="ctr">
-                      <a:solidFill>
-                        <a:schemeClr val="tx1"/>
-                      </a:solidFill>
-                      <a:prstDash val="solid"/>
-                      <a:round/>
-                      <a:headEnd type="none" w="med" len="med"/>
-                      <a:tailEnd type="none" w="med" len="med"/>
-                    </a:lnL>
-                    <a:lnR w="12700" cap="flat" cmpd="sng" algn="ctr">
-                      <a:solidFill>
-                        <a:schemeClr val="tx1"/>
-                      </a:solidFill>
-                      <a:prstDash val="solid"/>
-                      <a:round/>
-                      <a:headEnd type="none" w="med" len="med"/>
-                      <a:tailEnd type="none" w="med" len="med"/>
-                    </a:lnR>
-                    <a:lnT w="12700" cap="flat" cmpd="sng" algn="ctr">
-                      <a:solidFill>
-                        <a:schemeClr val="tx1"/>
-                      </a:solidFill>
-                      <a:prstDash val="solid"/>
-                      <a:round/>
-                      <a:headEnd type="none" w="med" len="med"/>
-                      <a:tailEnd type="none" w="med" len="med"/>
-                    </a:lnT>
-                    <a:lnB w="12700" cap="flat" cmpd="sng" algn="ctr">
-                      <a:solidFill>
-                        <a:schemeClr val="tx1"/>
-                      </a:solidFill>
-                      <a:prstDash val="solid"/>
-                      <a:round/>
-                      <a:headEnd type="none" w="med" len="med"/>
-                      <a:tailEnd type="none" w="med" len="med"/>
-                    </a:lnB>
-                    <a:noFill/>
-                  </a:tcPr>
-                </a:tc>
-                <a:tc>
-                  <a:txBody>
-                    <a:bodyPr/>
-                    <a:lstStyle/>
-                    <a:p>
-                      <a:pPr algn="ctr"/>
-                      <a:r>
-                        <a:rPr lang="en-US" sz="1800" dirty="0">
-                          <a:solidFill>
-                            <a:schemeClr val="tx1"/>
-                          </a:solidFill>
-                          <a:latin typeface="Times New Roman" panose="02020603050405020304" pitchFamily="18" charset="0"/>
-                          <a:cs typeface="Times New Roman" panose="02020603050405020304" pitchFamily="18" charset="0"/>
-                        </a:rPr>
-                        <a:t>NTM infection</a:t>
-                      </a:r>
-                    </a:p>
-                  </a:txBody>
-                  <a:tcPr anchor="ctr">
-                    <a:lnL w="12700" cap="flat" cmpd="sng" algn="ctr">
-                      <a:solidFill>
-                        <a:schemeClr val="tx1"/>
-                      </a:solidFill>
-                      <a:prstDash val="solid"/>
-                      <a:round/>
-                      <a:headEnd type="none" w="med" len="med"/>
-                      <a:tailEnd type="none" w="med" len="med"/>
-                    </a:lnL>
-                    <a:lnR w="12700" cap="flat" cmpd="sng" algn="ctr">
-                      <a:solidFill>
-                        <a:schemeClr val="tx1"/>
-                      </a:solidFill>
-                      <a:prstDash val="solid"/>
-                      <a:round/>
-                      <a:headEnd type="none" w="med" len="med"/>
-                      <a:tailEnd type="none" w="med" len="med"/>
-                    </a:lnR>
-                    <a:lnT w="12700" cap="flat" cmpd="sng" algn="ctr">
-                      <a:solidFill>
-                        <a:schemeClr val="tx1"/>
-                      </a:solidFill>
-                      <a:prstDash val="solid"/>
-                      <a:round/>
-                      <a:headEnd type="none" w="med" len="med"/>
-                      <a:tailEnd type="none" w="med" len="med"/>
-                    </a:lnT>
-                    <a:lnB w="12700" cap="flat" cmpd="sng" algn="ctr">
-                      <a:solidFill>
-                        <a:schemeClr val="tx1"/>
-                      </a:solidFill>
-                      <a:prstDash val="solid"/>
-                      <a:round/>
-                      <a:headEnd type="none" w="med" len="med"/>
-                      <a:tailEnd type="none" w="med" len="med"/>
-                    </a:lnB>
-                    <a:noFill/>
-                  </a:tcPr>
-                </a:tc>
-                <a:tc>
-                  <a:txBody>
-                    <a:bodyPr/>
-                    <a:lstStyle/>
-                    <a:p>
-                      <a:pPr algn="ctr"/>
-                      <a:r>
-                        <a:rPr lang="en-US" sz="1800" dirty="0">
-                          <a:solidFill>
-                            <a:schemeClr val="tx1"/>
-                          </a:solidFill>
-                          <a:latin typeface="Times New Roman" panose="02020603050405020304" pitchFamily="18" charset="0"/>
-                          <a:cs typeface="Times New Roman" panose="02020603050405020304" pitchFamily="18" charset="0"/>
-                        </a:rPr>
-                        <a:t>All*</a:t>
-                      </a:r>
-                    </a:p>
-                  </a:txBody>
-                  <a:tcPr anchor="ctr">
-                    <a:lnL w="12700" cap="flat" cmpd="sng" algn="ctr">
-                      <a:solidFill>
-                        <a:schemeClr val="tx1"/>
-                      </a:solidFill>
-                      <a:prstDash val="solid"/>
-                      <a:round/>
-                      <a:headEnd type="none" w="med" len="med"/>
-                      <a:tailEnd type="none" w="med" len="med"/>
-                    </a:lnL>
-                    <a:lnR w="12700" cap="flat" cmpd="sng" algn="ctr">
-                      <a:solidFill>
-                        <a:schemeClr val="tx1"/>
-                      </a:solidFill>
-                      <a:prstDash val="solid"/>
-                      <a:round/>
-                      <a:headEnd type="none" w="med" len="med"/>
-                      <a:tailEnd type="none" w="med" len="med"/>
-                    </a:lnR>
-                    <a:lnT w="12700" cap="flat" cmpd="sng" algn="ctr">
-                      <a:solidFill>
-                        <a:schemeClr val="tx1"/>
-                      </a:solidFill>
-                      <a:prstDash val="solid"/>
-                      <a:round/>
-                      <a:headEnd type="none" w="med" len="med"/>
-                      <a:tailEnd type="none" w="med" len="med"/>
-                    </a:lnT>
-                    <a:lnB w="12700" cap="flat" cmpd="sng" algn="ctr">
-                      <a:solidFill>
-                        <a:schemeClr val="tx1"/>
-                      </a:solidFill>
-                      <a:prstDash val="solid"/>
-                      <a:round/>
-                      <a:headEnd type="none" w="med" len="med"/>
-                      <a:tailEnd type="none" w="med" len="med"/>
-                    </a:lnB>
-                    <a:noFill/>
-                  </a:tcPr>
-                </a:tc>
-                <a:tc>
-                  <a:txBody>
-                    <a:bodyPr/>
-                    <a:lstStyle/>
-                    <a:p>
-                      <a:pPr algn="ctr"/>
-                      <a:r>
-                        <a:rPr lang="en-US" sz="1800" dirty="0">
-                          <a:solidFill>
-                            <a:schemeClr val="tx1"/>
-                          </a:solidFill>
-                          <a:latin typeface="Times New Roman" panose="02020603050405020304" pitchFamily="18" charset="0"/>
-                          <a:cs typeface="Times New Roman" panose="02020603050405020304" pitchFamily="18" charset="0"/>
-                        </a:rPr>
-                        <a:t>No</a:t>
-                      </a:r>
-                    </a:p>
-                  </a:txBody>
-                  <a:tcPr anchor="ctr">
-                    <a:lnL w="12700" cap="flat" cmpd="sng" algn="ctr">
-                      <a:solidFill>
-                        <a:schemeClr val="tx1"/>
-                      </a:solidFill>
-                      <a:prstDash val="solid"/>
-                      <a:round/>
-                      <a:headEnd type="none" w="med" len="med"/>
-                      <a:tailEnd type="none" w="med" len="med"/>
-                    </a:lnL>
-                    <a:lnR w="12700" cap="flat" cmpd="sng" algn="ctr">
-                      <a:solidFill>
-                        <a:schemeClr val="tx1"/>
-                      </a:solidFill>
-                      <a:prstDash val="solid"/>
-                      <a:round/>
-                      <a:headEnd type="none" w="med" len="med"/>
-                      <a:tailEnd type="none" w="med" len="med"/>
-                    </a:lnR>
-                    <a:lnT w="12700" cap="flat" cmpd="sng" algn="ctr">
-                      <a:solidFill>
-                        <a:schemeClr val="tx1"/>
-                      </a:solidFill>
-                      <a:prstDash val="solid"/>
-                      <a:round/>
-                      <a:headEnd type="none" w="med" len="med"/>
-                      <a:tailEnd type="none" w="med" len="med"/>
-                    </a:lnT>
-                    <a:lnB w="12700" cap="flat" cmpd="sng" algn="ctr">
-                      <a:solidFill>
-                        <a:schemeClr val="tx1"/>
-                      </a:solidFill>
-                      <a:prstDash val="solid"/>
-                      <a:round/>
-                      <a:headEnd type="none" w="med" len="med"/>
-                      <a:tailEnd type="none" w="med" len="med"/>
-                    </a:lnB>
-                    <a:noFill/>
-                  </a:tcPr>
-                </a:tc>
-                <a:tc>
-                  <a:txBody>
-                    <a:bodyPr/>
-                    <a:lstStyle/>
-                    <a:p>
-                      <a:pPr algn="ctr"/>
-                      <a:r>
-                        <a:rPr lang="en-US" sz="1800" dirty="0">
-                          <a:solidFill>
-                            <a:schemeClr val="tx1"/>
-                          </a:solidFill>
-                          <a:latin typeface="Times New Roman" panose="02020603050405020304" pitchFamily="18" charset="0"/>
-                          <a:cs typeface="Times New Roman" panose="02020603050405020304" pitchFamily="18" charset="0"/>
-                        </a:rPr>
-                        <a:t>Yes</a:t>
-                      </a:r>
-                    </a:p>
-                  </a:txBody>
-                  <a:tcPr anchor="ctr">
-                    <a:lnL w="12700" cap="flat" cmpd="sng" algn="ctr">
-                      <a:solidFill>
-                        <a:schemeClr val="tx1"/>
-                      </a:solidFill>
-                      <a:prstDash val="solid"/>
-                      <a:round/>
-                      <a:headEnd type="none" w="med" len="med"/>
-                      <a:tailEnd type="none" w="med" len="med"/>
-                    </a:lnL>
-                    <a:lnR w="12700" cap="flat" cmpd="sng" algn="ctr">
-                      <a:solidFill>
-                        <a:schemeClr val="tx1"/>
-                      </a:solidFill>
-                      <a:prstDash val="solid"/>
-                      <a:round/>
-                      <a:headEnd type="none" w="med" len="med"/>
-                      <a:tailEnd type="none" w="med" len="med"/>
-                    </a:lnR>
-                    <a:lnT w="12700" cap="flat" cmpd="sng" algn="ctr">
-                      <a:solidFill>
-                        <a:schemeClr val="tx1"/>
-                      </a:solidFill>
-                      <a:prstDash val="solid"/>
-                      <a:round/>
-                      <a:headEnd type="none" w="med" len="med"/>
-                      <a:tailEnd type="none" w="med" len="med"/>
-                    </a:lnT>
-                    <a:lnB w="12700" cap="flat" cmpd="sng" algn="ctr">
-                      <a:solidFill>
-                        <a:schemeClr val="tx1"/>
-                      </a:solidFill>
-                      <a:prstDash val="solid"/>
-                      <a:round/>
-                      <a:headEnd type="none" w="med" len="med"/>
-                      <a:tailEnd type="none" w="med" len="med"/>
-                    </a:lnB>
-                    <a:noFill/>
-                  </a:tcPr>
-                </a:tc>
-                <a:extLst>
-                  <a:ext uri="{0D108BD9-81ED-4DB2-BD59-A6C34878D82A}">
-                    <a16:rowId xmlns:a16="http://schemas.microsoft.com/office/drawing/2014/main" val="3726507944"/>
-                  </a:ext>
-                </a:extLst>
-              </a:tr>
-              <a:tr h="370840">
-                <a:tc>
-                  <a:txBody>
-                    <a:bodyPr/>
-                    <a:lstStyle/>
-                    <a:p>
-                      <a:pPr algn="ctr"/>
-                      <a:r>
-                        <a:rPr lang="en-US" sz="1800" b="1" dirty="0">
-                          <a:solidFill>
-                            <a:schemeClr val="tx1"/>
-                          </a:solidFill>
-                          <a:latin typeface="Times New Roman" panose="02020603050405020304" pitchFamily="18" charset="0"/>
-                          <a:cs typeface="Times New Roman" panose="02020603050405020304" pitchFamily="18" charset="0"/>
-                        </a:rPr>
-                        <a:t>Infect-Pre-SD (10)</a:t>
-                      </a:r>
-                    </a:p>
-                  </a:txBody>
-                  <a:tcPr anchor="ctr">
-                    <a:lnL w="12700" cap="flat" cmpd="sng" algn="ctr">
-                      <a:solidFill>
-                        <a:schemeClr val="tx1"/>
-                      </a:solidFill>
-                      <a:prstDash val="solid"/>
-                      <a:round/>
-                      <a:headEnd type="none" w="med" len="med"/>
-                      <a:tailEnd type="none" w="med" len="med"/>
-                    </a:lnL>
-                    <a:lnR w="12700" cap="flat" cmpd="sng" algn="ctr">
-                      <a:solidFill>
-                        <a:schemeClr val="tx1"/>
-                      </a:solidFill>
-                      <a:prstDash val="solid"/>
-                      <a:round/>
-                      <a:headEnd type="none" w="med" len="med"/>
-                      <a:tailEnd type="none" w="med" len="med"/>
-                    </a:lnR>
-                    <a:lnT w="12700" cap="flat" cmpd="sng" algn="ctr">
-                      <a:solidFill>
-                        <a:schemeClr val="tx1"/>
-                      </a:solidFill>
-                      <a:prstDash val="solid"/>
-                      <a:round/>
-                      <a:headEnd type="none" w="med" len="med"/>
-                      <a:tailEnd type="none" w="med" len="med"/>
-                    </a:lnT>
-                    <a:lnB w="12700" cap="flat" cmpd="sng" algn="ctr">
-                      <a:solidFill>
-                        <a:schemeClr val="tx1"/>
-                      </a:solidFill>
-                      <a:prstDash val="solid"/>
-                      <a:round/>
-                      <a:headEnd type="none" w="med" len="med"/>
-                      <a:tailEnd type="none" w="med" len="med"/>
-                    </a:lnB>
-                    <a:noFill/>
-                  </a:tcPr>
-                </a:tc>
-                <a:tc>
-                  <a:txBody>
-                    <a:bodyPr/>
-                    <a:lstStyle/>
-                    <a:p>
-                      <a:pPr algn="ctr"/>
-                      <a:r>
-                        <a:rPr lang="en-US" sz="1800" dirty="0">
-                          <a:solidFill>
-                            <a:schemeClr val="tx1"/>
-                          </a:solidFill>
-                          <a:latin typeface="Times New Roman" panose="02020603050405020304" pitchFamily="18" charset="0"/>
-                          <a:cs typeface="Times New Roman" panose="02020603050405020304" pitchFamily="18" charset="0"/>
-                        </a:rPr>
-                        <a:t>NTM infection</a:t>
-                      </a:r>
-                    </a:p>
-                  </a:txBody>
-                  <a:tcPr anchor="ctr">
-                    <a:lnL w="12700" cap="flat" cmpd="sng" algn="ctr">
-                      <a:solidFill>
-                        <a:schemeClr val="tx1"/>
-                      </a:solidFill>
-                      <a:prstDash val="solid"/>
-                      <a:round/>
-                      <a:headEnd type="none" w="med" len="med"/>
-                      <a:tailEnd type="none" w="med" len="med"/>
-                    </a:lnL>
-                    <a:lnR w="12700" cap="flat" cmpd="sng" algn="ctr">
-                      <a:solidFill>
-                        <a:schemeClr val="tx1"/>
-                      </a:solidFill>
-                      <a:prstDash val="solid"/>
-                      <a:round/>
-                      <a:headEnd type="none" w="med" len="med"/>
-                      <a:tailEnd type="none" w="med" len="med"/>
-                    </a:lnR>
-                    <a:lnT w="12700" cap="flat" cmpd="sng" algn="ctr">
-                      <a:solidFill>
-                        <a:schemeClr val="tx1"/>
-                      </a:solidFill>
-                      <a:prstDash val="solid"/>
-                      <a:round/>
-                      <a:headEnd type="none" w="med" len="med"/>
-                      <a:tailEnd type="none" w="med" len="med"/>
-                    </a:lnT>
-                    <a:lnB w="12700" cap="flat" cmpd="sng" algn="ctr">
-                      <a:solidFill>
-                        <a:schemeClr val="tx1"/>
-                      </a:solidFill>
-                      <a:prstDash val="solid"/>
-                      <a:round/>
-                      <a:headEnd type="none" w="med" len="med"/>
-                      <a:tailEnd type="none" w="med" len="med"/>
-                    </a:lnB>
-                    <a:noFill/>
-                  </a:tcPr>
-                </a:tc>
-                <a:tc>
-                  <a:txBody>
-                    <a:bodyPr/>
-                    <a:lstStyle/>
-                    <a:p>
-                      <a:pPr algn="ctr"/>
-                      <a:r>
-                        <a:rPr lang="en-US" sz="1800" dirty="0">
-                          <a:solidFill>
-                            <a:schemeClr val="tx1"/>
-                          </a:solidFill>
-                          <a:latin typeface="Times New Roman" panose="02020603050405020304" pitchFamily="18" charset="0"/>
-                          <a:cs typeface="Times New Roman" panose="02020603050405020304" pitchFamily="18" charset="0"/>
-                        </a:rPr>
-                        <a:t>Preceding (+) culture</a:t>
-                      </a:r>
-                    </a:p>
-                  </a:txBody>
-                  <a:tcPr anchor="ctr">
-                    <a:lnL w="12700" cap="flat" cmpd="sng" algn="ctr">
-                      <a:solidFill>
-                        <a:schemeClr val="tx1"/>
-                      </a:solidFill>
-                      <a:prstDash val="solid"/>
-                      <a:round/>
-                      <a:headEnd type="none" w="med" len="med"/>
-                      <a:tailEnd type="none" w="med" len="med"/>
-                    </a:lnL>
-                    <a:lnR w="12700" cap="flat" cmpd="sng" algn="ctr">
-                      <a:solidFill>
-                        <a:schemeClr val="tx1"/>
-                      </a:solidFill>
-                      <a:prstDash val="solid"/>
-                      <a:round/>
-                      <a:headEnd type="none" w="med" len="med"/>
-                      <a:tailEnd type="none" w="med" len="med"/>
-                    </a:lnR>
-                    <a:lnT w="12700" cap="flat" cmpd="sng" algn="ctr">
-                      <a:solidFill>
-                        <a:schemeClr val="tx1"/>
-                      </a:solidFill>
-                      <a:prstDash val="solid"/>
-                      <a:round/>
-                      <a:headEnd type="none" w="med" len="med"/>
-                      <a:tailEnd type="none" w="med" len="med"/>
-                    </a:lnT>
-                    <a:lnB w="12700" cap="flat" cmpd="sng" algn="ctr">
-                      <a:solidFill>
-                        <a:schemeClr val="tx1"/>
-                      </a:solidFill>
-                      <a:prstDash val="solid"/>
-                      <a:round/>
-                      <a:headEnd type="none" w="med" len="med"/>
-                      <a:tailEnd type="none" w="med" len="med"/>
-                    </a:lnB>
-                    <a:noFill/>
-                  </a:tcPr>
-                </a:tc>
-                <a:tc>
-                  <a:txBody>
-                    <a:bodyPr/>
-                    <a:lstStyle/>
-                    <a:p>
-                      <a:pPr algn="ctr"/>
-                      <a:r>
-                        <a:rPr lang="en-US" sz="1800" dirty="0">
-                          <a:solidFill>
-                            <a:schemeClr val="tx1"/>
-                          </a:solidFill>
-                          <a:latin typeface="Times New Roman" panose="02020603050405020304" pitchFamily="18" charset="0"/>
-                          <a:cs typeface="Times New Roman" panose="02020603050405020304" pitchFamily="18" charset="0"/>
-                        </a:rPr>
-                        <a:t>Yes</a:t>
-                      </a:r>
-                    </a:p>
-                  </a:txBody>
-                  <a:tcPr anchor="ctr">
-                    <a:lnL w="12700" cap="flat" cmpd="sng" algn="ctr">
-                      <a:solidFill>
-                        <a:schemeClr val="tx1"/>
-                      </a:solidFill>
-                      <a:prstDash val="solid"/>
-                      <a:round/>
-                      <a:headEnd type="none" w="med" len="med"/>
-                      <a:tailEnd type="none" w="med" len="med"/>
-                    </a:lnL>
-                    <a:lnR w="12700" cap="flat" cmpd="sng" algn="ctr">
-                      <a:solidFill>
-                        <a:schemeClr val="tx1"/>
-                      </a:solidFill>
-                      <a:prstDash val="solid"/>
-                      <a:round/>
-                      <a:headEnd type="none" w="med" len="med"/>
-                      <a:tailEnd type="none" w="med" len="med"/>
-                    </a:lnR>
-                    <a:lnT w="12700" cap="flat" cmpd="sng" algn="ctr">
-                      <a:solidFill>
-                        <a:schemeClr val="tx1"/>
-                      </a:solidFill>
-                      <a:prstDash val="solid"/>
-                      <a:round/>
-                      <a:headEnd type="none" w="med" len="med"/>
-                      <a:tailEnd type="none" w="med" len="med"/>
-                    </a:lnT>
-                    <a:lnB w="12700" cap="flat" cmpd="sng" algn="ctr">
-                      <a:solidFill>
-                        <a:schemeClr val="tx1"/>
-                      </a:solidFill>
-                      <a:prstDash val="solid"/>
-                      <a:round/>
-                      <a:headEnd type="none" w="med" len="med"/>
-                      <a:tailEnd type="none" w="med" len="med"/>
-                    </a:lnB>
-                    <a:noFill/>
-                  </a:tcPr>
-                </a:tc>
-                <a:tc>
-                  <a:txBody>
-                    <a:bodyPr/>
-                    <a:lstStyle/>
-                    <a:p>
-                      <a:pPr algn="ctr"/>
-                      <a:r>
-                        <a:rPr lang="en-US" sz="1800" dirty="0">
-                          <a:solidFill>
-                            <a:schemeClr val="tx1"/>
-                          </a:solidFill>
-                          <a:latin typeface="Times New Roman" panose="02020603050405020304" pitchFamily="18" charset="0"/>
-                          <a:cs typeface="Times New Roman" panose="02020603050405020304" pitchFamily="18" charset="0"/>
-                        </a:rPr>
-                        <a:t>Yes</a:t>
-                      </a:r>
+                      <a:endParaRPr lang="en-US" sz="1800" dirty="0">
+                        <a:solidFill>
+                          <a:schemeClr val="tx1"/>
+                        </a:solidFill>
+                        <a:latin typeface="Times New Roman" panose="02020603050405020304" pitchFamily="18" charset="0"/>
+                        <a:cs typeface="Times New Roman" panose="02020603050405020304" pitchFamily="18" charset="0"/>
+                      </a:endParaRPr>
                     </a:p>
                   </a:txBody>
                   <a:tcPr anchor="ctr">
@@ -7731,7 +5885,7 @@
         </p:nvSpPr>
         <p:spPr>
           <a:xfrm>
-            <a:off x="1845476" y="5808660"/>
+            <a:off x="1845476" y="5825285"/>
             <a:ext cx="8205516" cy="923330"/>
           </a:xfrm>
           <a:prstGeom prst="rect">

</xml_diff>

<commit_message>
Made more changes to the mothur analysis protocol
</commit_message>
<xml_diff>
--- a/figures/src_files/NTM_Update_3_5_18.pptx
+++ b/figures/src_files/NTM_Update_3_5_18.pptx
@@ -267,7 +267,7 @@
           <a:p>
             <a:fld id="{C2DF1586-880F-4D32-8F92-5423360BAD02}" type="datetimeFigureOut">
               <a:rPr lang="en-US" smtClean="0"/>
-              <a:t>3/5/2018</a:t>
+              <a:t>3/6/2018</a:t>
             </a:fld>
             <a:endParaRPr lang="en-US"/>
           </a:p>
@@ -465,7 +465,7 @@
           <a:p>
             <a:fld id="{C2DF1586-880F-4D32-8F92-5423360BAD02}" type="datetimeFigureOut">
               <a:rPr lang="en-US" smtClean="0"/>
-              <a:t>3/5/2018</a:t>
+              <a:t>3/6/2018</a:t>
             </a:fld>
             <a:endParaRPr lang="en-US"/>
           </a:p>
@@ -673,7 +673,7 @@
           <a:p>
             <a:fld id="{C2DF1586-880F-4D32-8F92-5423360BAD02}" type="datetimeFigureOut">
               <a:rPr lang="en-US" smtClean="0"/>
-              <a:t>3/5/2018</a:t>
+              <a:t>3/6/2018</a:t>
             </a:fld>
             <a:endParaRPr lang="en-US"/>
           </a:p>
@@ -871,7 +871,7 @@
           <a:p>
             <a:fld id="{C2DF1586-880F-4D32-8F92-5423360BAD02}" type="datetimeFigureOut">
               <a:rPr lang="en-US" smtClean="0"/>
-              <a:t>3/5/2018</a:t>
+              <a:t>3/6/2018</a:t>
             </a:fld>
             <a:endParaRPr lang="en-US"/>
           </a:p>
@@ -1146,7 +1146,7 @@
           <a:p>
             <a:fld id="{C2DF1586-880F-4D32-8F92-5423360BAD02}" type="datetimeFigureOut">
               <a:rPr lang="en-US" smtClean="0"/>
-              <a:t>3/5/2018</a:t>
+              <a:t>3/6/2018</a:t>
             </a:fld>
             <a:endParaRPr lang="en-US"/>
           </a:p>
@@ -1411,7 +1411,7 @@
           <a:p>
             <a:fld id="{C2DF1586-880F-4D32-8F92-5423360BAD02}" type="datetimeFigureOut">
               <a:rPr lang="en-US" smtClean="0"/>
-              <a:t>3/5/2018</a:t>
+              <a:t>3/6/2018</a:t>
             </a:fld>
             <a:endParaRPr lang="en-US"/>
           </a:p>
@@ -1823,7 +1823,7 @@
           <a:p>
             <a:fld id="{C2DF1586-880F-4D32-8F92-5423360BAD02}" type="datetimeFigureOut">
               <a:rPr lang="en-US" smtClean="0"/>
-              <a:t>3/5/2018</a:t>
+              <a:t>3/6/2018</a:t>
             </a:fld>
             <a:endParaRPr lang="en-US"/>
           </a:p>
@@ -1964,7 +1964,7 @@
           <a:p>
             <a:fld id="{C2DF1586-880F-4D32-8F92-5423360BAD02}" type="datetimeFigureOut">
               <a:rPr lang="en-US" smtClean="0"/>
-              <a:t>3/5/2018</a:t>
+              <a:t>3/6/2018</a:t>
             </a:fld>
             <a:endParaRPr lang="en-US"/>
           </a:p>
@@ -2077,7 +2077,7 @@
           <a:p>
             <a:fld id="{C2DF1586-880F-4D32-8F92-5423360BAD02}" type="datetimeFigureOut">
               <a:rPr lang="en-US" smtClean="0"/>
-              <a:t>3/5/2018</a:t>
+              <a:t>3/6/2018</a:t>
             </a:fld>
             <a:endParaRPr lang="en-US"/>
           </a:p>
@@ -2388,7 +2388,7 @@
           <a:p>
             <a:fld id="{C2DF1586-880F-4D32-8F92-5423360BAD02}" type="datetimeFigureOut">
               <a:rPr lang="en-US" smtClean="0"/>
-              <a:t>3/5/2018</a:t>
+              <a:t>3/6/2018</a:t>
             </a:fld>
             <a:endParaRPr lang="en-US"/>
           </a:p>
@@ -2676,7 +2676,7 @@
           <a:p>
             <a:fld id="{C2DF1586-880F-4D32-8F92-5423360BAD02}" type="datetimeFigureOut">
               <a:rPr lang="en-US" smtClean="0"/>
-              <a:t>3/5/2018</a:t>
+              <a:t>3/6/2018</a:t>
             </a:fld>
             <a:endParaRPr lang="en-US"/>
           </a:p>
@@ -2917,7 +2917,7 @@
           <a:p>
             <a:fld id="{C2DF1586-880F-4D32-8F92-5423360BAD02}" type="datetimeFigureOut">
               <a:rPr lang="en-US" smtClean="0"/>
-              <a:t>3/5/2018</a:t>
+              <a:t>3/6/2018</a:t>
             </a:fld>
             <a:endParaRPr lang="en-US"/>
           </a:p>
@@ -4399,14 +4399,14 @@
           <p:nvPr>
             <p:extLst>
               <p:ext uri="{D42A27DB-BD31-4B8C-83A1-F6EECF244321}">
-                <p14:modId xmlns:p14="http://schemas.microsoft.com/office/powerpoint/2010/main" val="2879268788"/>
+                <p14:modId xmlns:p14="http://schemas.microsoft.com/office/powerpoint/2010/main" val="977620616"/>
               </p:ext>
             </p:extLst>
           </p:nvPr>
         </p:nvGraphicFramePr>
         <p:xfrm>
           <a:off x="2365911" y="1729490"/>
-          <a:ext cx="7469414" cy="2682240"/>
+          <a:ext cx="7469414" cy="1940560"/>
         </p:xfrm>
         <a:graphic>
           <a:graphicData uri="http://schemas.openxmlformats.org/drawingml/2006/table">
@@ -5056,17 +5056,7 @@
                           <a:latin typeface="Times New Roman" panose="02020603050405020304" pitchFamily="18" charset="0"/>
                           <a:cs typeface="Times New Roman" panose="02020603050405020304" pitchFamily="18" charset="0"/>
                         </a:rPr>
-                        <a:t>Disease-Index </a:t>
-                      </a:r>
-                      <a:r>
-                        <a:rPr lang="en-US" sz="1800" b="1" dirty="0" smtClean="0">
-                          <a:solidFill>
-                            <a:schemeClr val="tx1"/>
-                          </a:solidFill>
-                          <a:latin typeface="Times New Roman" panose="02020603050405020304" pitchFamily="18" charset="0"/>
-                          <a:cs typeface="Times New Roman" panose="02020603050405020304" pitchFamily="18" charset="0"/>
-                        </a:rPr>
-                        <a:t>(3)</a:t>
+                        <a:t>Disease-Index (3)</a:t>
                       </a:r>
                       <a:endParaRPr lang="en-US" sz="1800" b="1" dirty="0">
                         <a:solidFill>
@@ -5268,203 +5258,8 @@
                           <a:latin typeface="Times New Roman" panose="02020603050405020304" pitchFamily="18" charset="0"/>
                           <a:cs typeface="Times New Roman" panose="02020603050405020304" pitchFamily="18" charset="0"/>
                         </a:rPr>
-                        <a:t>Infect-All (4)</a:t>
+                        <a:t>Persist-All </a:t>
                       </a:r>
-                      <a:endParaRPr lang="en-US" sz="1800" b="1" dirty="0">
-                        <a:solidFill>
-                          <a:schemeClr val="tx1"/>
-                        </a:solidFill>
-                        <a:latin typeface="Times New Roman" panose="02020603050405020304" pitchFamily="18" charset="0"/>
-                        <a:cs typeface="Times New Roman" panose="02020603050405020304" pitchFamily="18" charset="0"/>
-                      </a:endParaRPr>
-                    </a:p>
-                  </a:txBody>
-                  <a:tcPr anchor="ctr">
-                    <a:lnL w="12700" cap="flat" cmpd="sng" algn="ctr">
-                      <a:solidFill>
-                        <a:schemeClr val="tx1"/>
-                      </a:solidFill>
-                      <a:prstDash val="solid"/>
-                      <a:round/>
-                      <a:headEnd type="none" w="med" len="med"/>
-                      <a:tailEnd type="none" w="med" len="med"/>
-                    </a:lnL>
-                    <a:lnR w="12700" cap="flat" cmpd="sng" algn="ctr">
-                      <a:solidFill>
-                        <a:schemeClr val="tx1"/>
-                      </a:solidFill>
-                      <a:prstDash val="solid"/>
-                      <a:round/>
-                      <a:headEnd type="none" w="med" len="med"/>
-                      <a:tailEnd type="none" w="med" len="med"/>
-                    </a:lnR>
-                    <a:lnT w="12700" cap="flat" cmpd="sng" algn="ctr">
-                      <a:solidFill>
-                        <a:schemeClr val="tx1"/>
-                      </a:solidFill>
-                      <a:prstDash val="solid"/>
-                      <a:round/>
-                      <a:headEnd type="none" w="med" len="med"/>
-                      <a:tailEnd type="none" w="med" len="med"/>
-                    </a:lnT>
-                    <a:lnB w="12700" cap="flat" cmpd="sng" algn="ctr">
-                      <a:solidFill>
-                        <a:schemeClr val="tx1"/>
-                      </a:solidFill>
-                      <a:prstDash val="solid"/>
-                      <a:round/>
-                      <a:headEnd type="none" w="med" len="med"/>
-                      <a:tailEnd type="none" w="med" len="med"/>
-                    </a:lnB>
-                    <a:noFill/>
-                  </a:tcPr>
-                </a:tc>
-                <a:tc>
-                  <a:txBody>
-                    <a:bodyPr/>
-                    <a:lstStyle/>
-                    <a:p>
-                      <a:pPr algn="ctr"/>
-                      <a:r>
-                        <a:rPr lang="en-US" sz="1800" dirty="0" smtClean="0">
-                          <a:solidFill>
-                            <a:schemeClr val="tx1"/>
-                          </a:solidFill>
-                          <a:latin typeface="Times New Roman" panose="02020603050405020304" pitchFamily="18" charset="0"/>
-                          <a:cs typeface="Times New Roman" panose="02020603050405020304" pitchFamily="18" charset="0"/>
-                        </a:rPr>
-                        <a:t>Pre/Post </a:t>
-                      </a:r>
-                      <a:r>
-                        <a:rPr lang="en-US" sz="1800" dirty="0">
-                          <a:solidFill>
-                            <a:schemeClr val="tx1"/>
-                          </a:solidFill>
-                          <a:latin typeface="Times New Roman" panose="02020603050405020304" pitchFamily="18" charset="0"/>
-                          <a:cs typeface="Times New Roman" panose="02020603050405020304" pitchFamily="18" charset="0"/>
-                        </a:rPr>
-                        <a:t>infection</a:t>
-                      </a:r>
-                    </a:p>
-                  </a:txBody>
-                  <a:tcPr anchor="ctr">
-                    <a:lnL w="12700" cap="flat" cmpd="sng" algn="ctr">
-                      <a:solidFill>
-                        <a:schemeClr val="tx1"/>
-                      </a:solidFill>
-                      <a:prstDash val="solid"/>
-                      <a:round/>
-                      <a:headEnd type="none" w="med" len="med"/>
-                      <a:tailEnd type="none" w="med" len="med"/>
-                    </a:lnL>
-                    <a:lnR w="12700" cap="flat" cmpd="sng" algn="ctr">
-                      <a:solidFill>
-                        <a:schemeClr val="tx1"/>
-                      </a:solidFill>
-                      <a:prstDash val="solid"/>
-                      <a:round/>
-                      <a:headEnd type="none" w="med" len="med"/>
-                      <a:tailEnd type="none" w="med" len="med"/>
-                    </a:lnR>
-                    <a:lnT w="12700" cap="flat" cmpd="sng" algn="ctr">
-                      <a:solidFill>
-                        <a:schemeClr val="tx1"/>
-                      </a:solidFill>
-                      <a:prstDash val="solid"/>
-                      <a:round/>
-                      <a:headEnd type="none" w="med" len="med"/>
-                      <a:tailEnd type="none" w="med" len="med"/>
-                    </a:lnT>
-                    <a:lnB w="12700" cap="flat" cmpd="sng" algn="ctr">
-                      <a:solidFill>
-                        <a:schemeClr val="tx1"/>
-                      </a:solidFill>
-                      <a:prstDash val="solid"/>
-                      <a:round/>
-                      <a:headEnd type="none" w="med" len="med"/>
-                      <a:tailEnd type="none" w="med" len="med"/>
-                    </a:lnB>
-                    <a:noFill/>
-                  </a:tcPr>
-                </a:tc>
-                <a:tc>
-                  <a:txBody>
-                    <a:bodyPr/>
-                    <a:lstStyle/>
-                    <a:p>
-                      <a:pPr algn="ctr"/>
-                      <a:r>
-                        <a:rPr lang="en-US" sz="1800" dirty="0" smtClean="0">
-                          <a:solidFill>
-                            <a:schemeClr val="tx1"/>
-                          </a:solidFill>
-                          <a:latin typeface="Times New Roman" panose="02020603050405020304" pitchFamily="18" charset="0"/>
-                          <a:cs typeface="Times New Roman" panose="02020603050405020304" pitchFamily="18" charset="0"/>
-                        </a:rPr>
-                        <a:t>All</a:t>
-                      </a:r>
-                      <a:endParaRPr lang="en-US" sz="1800" dirty="0">
-                        <a:solidFill>
-                          <a:schemeClr val="tx1"/>
-                        </a:solidFill>
-                        <a:latin typeface="Times New Roman" panose="02020603050405020304" pitchFamily="18" charset="0"/>
-                        <a:cs typeface="Times New Roman" panose="02020603050405020304" pitchFamily="18" charset="0"/>
-                      </a:endParaRPr>
-                    </a:p>
-                  </a:txBody>
-                  <a:tcPr anchor="ctr">
-                    <a:lnL w="12700" cap="flat" cmpd="sng" algn="ctr">
-                      <a:solidFill>
-                        <a:schemeClr val="tx1"/>
-                      </a:solidFill>
-                      <a:prstDash val="solid"/>
-                      <a:round/>
-                      <a:headEnd type="none" w="med" len="med"/>
-                      <a:tailEnd type="none" w="med" len="med"/>
-                    </a:lnL>
-                    <a:lnR w="12700" cap="flat" cmpd="sng" algn="ctr">
-                      <a:solidFill>
-                        <a:schemeClr val="tx1"/>
-                      </a:solidFill>
-                      <a:prstDash val="solid"/>
-                      <a:round/>
-                      <a:headEnd type="none" w="med" len="med"/>
-                      <a:tailEnd type="none" w="med" len="med"/>
-                    </a:lnR>
-                    <a:lnT w="12700" cap="flat" cmpd="sng" algn="ctr">
-                      <a:solidFill>
-                        <a:schemeClr val="tx1"/>
-                      </a:solidFill>
-                      <a:prstDash val="solid"/>
-                      <a:round/>
-                      <a:headEnd type="none" w="med" len="med"/>
-                      <a:tailEnd type="none" w="med" len="med"/>
-                    </a:lnT>
-                    <a:lnB w="12700" cap="flat" cmpd="sng" algn="ctr">
-                      <a:solidFill>
-                        <a:schemeClr val="tx1"/>
-                      </a:solidFill>
-                      <a:prstDash val="solid"/>
-                      <a:round/>
-                      <a:headEnd type="none" w="med" len="med"/>
-                      <a:tailEnd type="none" w="med" len="med"/>
-                    </a:lnB>
-                    <a:noFill/>
-                  </a:tcPr>
-                </a:tc>
-                <a:extLst>
-                  <a:ext uri="{0D108BD9-81ED-4DB2-BD59-A6C34878D82A}">
-                    <a16:rowId xmlns:a16="http://schemas.microsoft.com/office/drawing/2014/main" val="2610292201"/>
-                  </a:ext>
-                </a:extLst>
-              </a:tr>
-              <a:tr h="370840">
-                <a:tc>
-                  <a:txBody>
-                    <a:bodyPr/>
-                    <a:lstStyle/>
-                    <a:p>
-                      <a:pPr algn="ctr"/>
                       <a:r>
                         <a:rPr lang="en-US" sz="1800" b="1" dirty="0" smtClean="0">
                           <a:solidFill>
@@ -5473,222 +5268,7 @@
                           <a:latin typeface="Times New Roman" panose="02020603050405020304" pitchFamily="18" charset="0"/>
                           <a:cs typeface="Times New Roman" panose="02020603050405020304" pitchFamily="18" charset="0"/>
                         </a:rPr>
-                        <a:t>Infect-Main (5)</a:t>
-                      </a:r>
-                      <a:endParaRPr lang="en-US" sz="1800" b="1" dirty="0">
-                        <a:solidFill>
-                          <a:schemeClr val="tx1"/>
-                        </a:solidFill>
-                        <a:latin typeface="Times New Roman" panose="02020603050405020304" pitchFamily="18" charset="0"/>
-                        <a:cs typeface="Times New Roman" panose="02020603050405020304" pitchFamily="18" charset="0"/>
-                      </a:endParaRPr>
-                    </a:p>
-                  </a:txBody>
-                  <a:tcPr anchor="ctr">
-                    <a:lnL w="12700" cap="flat" cmpd="sng" algn="ctr">
-                      <a:solidFill>
-                        <a:schemeClr val="tx1"/>
-                      </a:solidFill>
-                      <a:prstDash val="solid"/>
-                      <a:round/>
-                      <a:headEnd type="none" w="med" len="med"/>
-                      <a:tailEnd type="none" w="med" len="med"/>
-                    </a:lnL>
-                    <a:lnR w="12700" cap="flat" cmpd="sng" algn="ctr">
-                      <a:solidFill>
-                        <a:schemeClr val="tx1"/>
-                      </a:solidFill>
-                      <a:prstDash val="solid"/>
-                      <a:round/>
-                      <a:headEnd type="none" w="med" len="med"/>
-                      <a:tailEnd type="none" w="med" len="med"/>
-                    </a:lnR>
-                    <a:lnT w="12700" cap="flat" cmpd="sng" algn="ctr">
-                      <a:solidFill>
-                        <a:schemeClr val="tx1"/>
-                      </a:solidFill>
-                      <a:prstDash val="solid"/>
-                      <a:round/>
-                      <a:headEnd type="none" w="med" len="med"/>
-                      <a:tailEnd type="none" w="med" len="med"/>
-                    </a:lnT>
-                    <a:lnB w="12700" cap="flat" cmpd="sng" algn="ctr">
-                      <a:solidFill>
-                        <a:schemeClr val="tx1"/>
-                      </a:solidFill>
-                      <a:prstDash val="solid"/>
-                      <a:round/>
-                      <a:headEnd type="none" w="med" len="med"/>
-                      <a:tailEnd type="none" w="med" len="med"/>
-                    </a:lnB>
-                    <a:noFill/>
-                  </a:tcPr>
-                </a:tc>
-                <a:tc>
-                  <a:txBody>
-                    <a:bodyPr/>
-                    <a:lstStyle/>
-                    <a:p>
-                      <a:pPr algn="ctr"/>
-                      <a:r>
-                        <a:rPr lang="en-US" sz="1800" dirty="0" smtClean="0">
-                          <a:solidFill>
-                            <a:schemeClr val="tx1"/>
-                          </a:solidFill>
-                          <a:latin typeface="Times New Roman" panose="02020603050405020304" pitchFamily="18" charset="0"/>
-                          <a:cs typeface="Times New Roman" panose="02020603050405020304" pitchFamily="18" charset="0"/>
-                        </a:rPr>
-                        <a:t>Pre/Post </a:t>
-                      </a:r>
-                      <a:r>
-                        <a:rPr lang="en-US" sz="1800" dirty="0">
-                          <a:solidFill>
-                            <a:schemeClr val="tx1"/>
-                          </a:solidFill>
-                          <a:latin typeface="Times New Roman" panose="02020603050405020304" pitchFamily="18" charset="0"/>
-                          <a:cs typeface="Times New Roman" panose="02020603050405020304" pitchFamily="18" charset="0"/>
-                        </a:rPr>
-                        <a:t>infection</a:t>
-                      </a:r>
-                    </a:p>
-                  </a:txBody>
-                  <a:tcPr anchor="ctr">
-                    <a:lnL w="12700" cap="flat" cmpd="sng" algn="ctr">
-                      <a:solidFill>
-                        <a:schemeClr val="tx1"/>
-                      </a:solidFill>
-                      <a:prstDash val="solid"/>
-                      <a:round/>
-                      <a:headEnd type="none" w="med" len="med"/>
-                      <a:tailEnd type="none" w="med" len="med"/>
-                    </a:lnL>
-                    <a:lnR w="12700" cap="flat" cmpd="sng" algn="ctr">
-                      <a:solidFill>
-                        <a:schemeClr val="tx1"/>
-                      </a:solidFill>
-                      <a:prstDash val="solid"/>
-                      <a:round/>
-                      <a:headEnd type="none" w="med" len="med"/>
-                      <a:tailEnd type="none" w="med" len="med"/>
-                    </a:lnR>
-                    <a:lnT w="12700" cap="flat" cmpd="sng" algn="ctr">
-                      <a:solidFill>
-                        <a:schemeClr val="tx1"/>
-                      </a:solidFill>
-                      <a:prstDash val="solid"/>
-                      <a:round/>
-                      <a:headEnd type="none" w="med" len="med"/>
-                      <a:tailEnd type="none" w="med" len="med"/>
-                    </a:lnT>
-                    <a:lnB w="12700" cap="flat" cmpd="sng" algn="ctr">
-                      <a:solidFill>
-                        <a:schemeClr val="tx1"/>
-                      </a:solidFill>
-                      <a:prstDash val="solid"/>
-                      <a:round/>
-                      <a:headEnd type="none" w="med" len="med"/>
-                      <a:tailEnd type="none" w="med" len="med"/>
-                    </a:lnB>
-                    <a:noFill/>
-                  </a:tcPr>
-                </a:tc>
-                <a:tc>
-                  <a:txBody>
-                    <a:bodyPr/>
-                    <a:lstStyle/>
-                    <a:p>
-                      <a:pPr algn="ctr"/>
-                      <a:r>
-                        <a:rPr lang="en-US" sz="1800" dirty="0">
-                          <a:solidFill>
-                            <a:schemeClr val="tx1"/>
-                          </a:solidFill>
-                          <a:latin typeface="Times New Roman" panose="02020603050405020304" pitchFamily="18" charset="0"/>
-                          <a:cs typeface="Times New Roman" panose="02020603050405020304" pitchFamily="18" charset="0"/>
-                        </a:rPr>
-                        <a:t>MAC/Mab. (+) </a:t>
-                      </a:r>
-                      <a:r>
-                        <a:rPr lang="en-US" sz="1800" dirty="0" smtClean="0">
-                          <a:solidFill>
-                            <a:schemeClr val="tx1"/>
-                          </a:solidFill>
-                          <a:latin typeface="Times New Roman" panose="02020603050405020304" pitchFamily="18" charset="0"/>
-                          <a:cs typeface="Times New Roman" panose="02020603050405020304" pitchFamily="18" charset="0"/>
-                        </a:rPr>
-                        <a:t>only</a:t>
-                      </a:r>
-                      <a:endParaRPr lang="en-US" sz="1800" dirty="0">
-                        <a:solidFill>
-                          <a:schemeClr val="tx1"/>
-                        </a:solidFill>
-                        <a:latin typeface="Times New Roman" panose="02020603050405020304" pitchFamily="18" charset="0"/>
-                        <a:cs typeface="Times New Roman" panose="02020603050405020304" pitchFamily="18" charset="0"/>
-                      </a:endParaRPr>
-                    </a:p>
-                  </a:txBody>
-                  <a:tcPr anchor="ctr">
-                    <a:lnL w="12700" cap="flat" cmpd="sng" algn="ctr">
-                      <a:solidFill>
-                        <a:schemeClr val="tx1"/>
-                      </a:solidFill>
-                      <a:prstDash val="solid"/>
-                      <a:round/>
-                      <a:headEnd type="none" w="med" len="med"/>
-                      <a:tailEnd type="none" w="med" len="med"/>
-                    </a:lnL>
-                    <a:lnR w="12700" cap="flat" cmpd="sng" algn="ctr">
-                      <a:solidFill>
-                        <a:schemeClr val="tx1"/>
-                      </a:solidFill>
-                      <a:prstDash val="solid"/>
-                      <a:round/>
-                      <a:headEnd type="none" w="med" len="med"/>
-                      <a:tailEnd type="none" w="med" len="med"/>
-                    </a:lnR>
-                    <a:lnT w="12700" cap="flat" cmpd="sng" algn="ctr">
-                      <a:solidFill>
-                        <a:schemeClr val="tx1"/>
-                      </a:solidFill>
-                      <a:prstDash val="solid"/>
-                      <a:round/>
-                      <a:headEnd type="none" w="med" len="med"/>
-                      <a:tailEnd type="none" w="med" len="med"/>
-                    </a:lnT>
-                    <a:lnB w="12700" cap="flat" cmpd="sng" algn="ctr">
-                      <a:solidFill>
-                        <a:schemeClr val="tx1"/>
-                      </a:solidFill>
-                      <a:prstDash val="solid"/>
-                      <a:round/>
-                      <a:headEnd type="none" w="med" len="med"/>
-                      <a:tailEnd type="none" w="med" len="med"/>
-                    </a:lnB>
-                    <a:noFill/>
-                  </a:tcPr>
-                </a:tc>
-                <a:extLst>
-                  <a:ext uri="{0D108BD9-81ED-4DB2-BD59-A6C34878D82A}">
-                    <a16:rowId xmlns:a16="http://schemas.microsoft.com/office/drawing/2014/main" val="3591621812"/>
-                  </a:ext>
-                </a:extLst>
-              </a:tr>
-              <a:tr h="370840">
-                <a:tc>
-                  <a:txBody>
-                    <a:bodyPr/>
-                    <a:lstStyle/>
-                    <a:p>
-                      <a:pPr algn="ctr"/>
-                      <a:r>
-                        <a:rPr lang="en-US" sz="1800" b="1" dirty="0" smtClean="0">
-                          <a:solidFill>
-                            <a:schemeClr val="tx1"/>
-                          </a:solidFill>
-                          <a:latin typeface="Times New Roman" panose="02020603050405020304" pitchFamily="18" charset="0"/>
-                          <a:cs typeface="Times New Roman" panose="02020603050405020304" pitchFamily="18" charset="0"/>
-                        </a:rPr>
-                        <a:t>Persist-All (6)</a:t>
+                        <a:t>(4)</a:t>
                       </a:r>
                       <a:endParaRPr lang="en-US" sz="1800" b="1" dirty="0">
                         <a:solidFill>

</xml_diff>